<commit_message>
Update Mission content (Hash: fb87dff)
</commit_message>
<xml_diff>
--- a/documentation/images/easyfranchise-diagrams.pptx
+++ b/documentation/images/easyfranchise-diagrams.pptx
@@ -270,7 +270,7 @@
           <a:p>
             <a:fld id="{11055433-DDDA-1147-A71A-BE0AE55CB161}" type="datetimeFigureOut">
               <a:rPr lang="en-DE" smtClean="0"/>
-              <a:t>15.12.21</a:t>
+              <a:t>01/24/2022</a:t>
             </a:fld>
             <a:endParaRPr lang="en-DE"/>
           </a:p>
@@ -470,7 +470,7 @@
           <a:p>
             <a:fld id="{11055433-DDDA-1147-A71A-BE0AE55CB161}" type="datetimeFigureOut">
               <a:rPr lang="en-DE" smtClean="0"/>
-              <a:t>15.12.21</a:t>
+              <a:t>01/24/2022</a:t>
             </a:fld>
             <a:endParaRPr lang="en-DE"/>
           </a:p>
@@ -680,7 +680,7 @@
           <a:p>
             <a:fld id="{11055433-DDDA-1147-A71A-BE0AE55CB161}" type="datetimeFigureOut">
               <a:rPr lang="en-DE" smtClean="0"/>
-              <a:t>15.12.21</a:t>
+              <a:t>01/24/2022</a:t>
             </a:fld>
             <a:endParaRPr lang="en-DE"/>
           </a:p>
@@ -880,7 +880,7 @@
           <a:p>
             <a:fld id="{6108F170-7087-4325-8F5D-6140410ED24A}" type="datetimeFigureOut">
               <a:rPr lang="de-DE" smtClean="0"/>
-              <a:t>15.12.21</a:t>
+              <a:t>24.01.2022</a:t>
             </a:fld>
             <a:endParaRPr lang="de-DE"/>
           </a:p>
@@ -1186,7 +1186,7 @@
           <a:p>
             <a:fld id="{11055433-DDDA-1147-A71A-BE0AE55CB161}" type="datetimeFigureOut">
               <a:rPr lang="en-DE" smtClean="0"/>
-              <a:t>15.12.21</a:t>
+              <a:t>01/24/2022</a:t>
             </a:fld>
             <a:endParaRPr lang="en-DE"/>
           </a:p>
@@ -1454,7 +1454,7 @@
           <a:p>
             <a:fld id="{11055433-DDDA-1147-A71A-BE0AE55CB161}" type="datetimeFigureOut">
               <a:rPr lang="en-DE" smtClean="0"/>
-              <a:t>15.12.21</a:t>
+              <a:t>01/24/2022</a:t>
             </a:fld>
             <a:endParaRPr lang="en-DE"/>
           </a:p>
@@ -1869,7 +1869,7 @@
           <a:p>
             <a:fld id="{11055433-DDDA-1147-A71A-BE0AE55CB161}" type="datetimeFigureOut">
               <a:rPr lang="en-DE" smtClean="0"/>
-              <a:t>15.12.21</a:t>
+              <a:t>01/24/2022</a:t>
             </a:fld>
             <a:endParaRPr lang="en-DE"/>
           </a:p>
@@ -2011,7 +2011,7 @@
           <a:p>
             <a:fld id="{11055433-DDDA-1147-A71A-BE0AE55CB161}" type="datetimeFigureOut">
               <a:rPr lang="en-DE" smtClean="0"/>
-              <a:t>15.12.21</a:t>
+              <a:t>01/24/2022</a:t>
             </a:fld>
             <a:endParaRPr lang="en-DE"/>
           </a:p>
@@ -2124,7 +2124,7 @@
           <a:p>
             <a:fld id="{11055433-DDDA-1147-A71A-BE0AE55CB161}" type="datetimeFigureOut">
               <a:rPr lang="en-DE" smtClean="0"/>
-              <a:t>15.12.21</a:t>
+              <a:t>01/24/2022</a:t>
             </a:fld>
             <a:endParaRPr lang="en-DE"/>
           </a:p>
@@ -2437,7 +2437,7 @@
           <a:p>
             <a:fld id="{11055433-DDDA-1147-A71A-BE0AE55CB161}" type="datetimeFigureOut">
               <a:rPr lang="en-DE" smtClean="0"/>
-              <a:t>15.12.21</a:t>
+              <a:t>01/24/2022</a:t>
             </a:fld>
             <a:endParaRPr lang="en-DE"/>
           </a:p>
@@ -2726,7 +2726,7 @@
           <a:p>
             <a:fld id="{11055433-DDDA-1147-A71A-BE0AE55CB161}" type="datetimeFigureOut">
               <a:rPr lang="en-DE" smtClean="0"/>
-              <a:t>15.12.21</a:t>
+              <a:t>01/24/2022</a:t>
             </a:fld>
             <a:endParaRPr lang="en-DE"/>
           </a:p>
@@ -2969,7 +2969,7 @@
           <a:p>
             <a:fld id="{11055433-DDDA-1147-A71A-BE0AE55CB161}" type="datetimeFigureOut">
               <a:rPr lang="en-DE" smtClean="0"/>
-              <a:t>15.12.21</a:t>
+              <a:t>01/24/2022</a:t>
             </a:fld>
             <a:endParaRPr lang="en-DE"/>
           </a:p>
@@ -5075,8 +5075,8 @@
         </p:nvSpPr>
         <p:spPr>
           <a:xfrm>
-            <a:off x="8584142" y="1740707"/>
-            <a:ext cx="1773504" cy="1200329"/>
+            <a:off x="8584142" y="1854251"/>
+            <a:ext cx="1773504" cy="923330"/>
           </a:xfrm>
           <a:prstGeom prst="rect">
             <a:avLst/>
@@ -5092,11 +5092,7 @@
             <a:pPr algn="ctr"/>
             <a:r>
               <a:rPr lang="en-GB" dirty="0"/>
-              <a:t>Easy Franchise (UAA) Viewer Role Collection </a:t>
-            </a:r>
-            <a:r>
-              <a:rPr lang="en-GB" dirty="0" err="1"/>
-              <a:t>easyfranchise</a:t>
+              <a:t>Easy Franchise Viewer (basis-mission)</a:t>
             </a:r>
             <a:endParaRPr lang="en-DE" dirty="0"/>
           </a:p>
@@ -5116,8 +5112,8 @@
         </p:nvSpPr>
         <p:spPr>
           <a:xfrm>
-            <a:off x="8558934" y="3651460"/>
-            <a:ext cx="1823919" cy="1200329"/>
+            <a:off x="8558934" y="3759970"/>
+            <a:ext cx="1823919" cy="923330"/>
           </a:xfrm>
           <a:prstGeom prst="rect">
             <a:avLst/>
@@ -5133,11 +5129,7 @@
             <a:pPr algn="ctr"/>
             <a:r>
               <a:rPr lang="en-GB" dirty="0"/>
-              <a:t>Easy Franchise (UAA) Backend Role Collection </a:t>
-            </a:r>
-            <a:r>
-              <a:rPr lang="en-GB" dirty="0" err="1"/>
-              <a:t>easyfranchise</a:t>
+              <a:t>Easy Franchise Backend (basis-mission)</a:t>
             </a:r>
             <a:endParaRPr lang="en-DE" dirty="0"/>
           </a:p>

</xml_diff>

<commit_message>
use SAP HANA Cloud multi environment
</commit_message>
<xml_diff>
--- a/documentation/images/easyfranchise-diagrams.pptx
+++ b/documentation/images/easyfranchise-diagrams.pptx
@@ -4,6 +4,9 @@
   <p:sldMasterIdLst>
     <p:sldMasterId id="2147483648" r:id="rId1"/>
   </p:sldMasterIdLst>
+  <p:notesMasterIdLst>
+    <p:notesMasterId r:id="rId12"/>
+  </p:notesMasterIdLst>
   <p:sldIdLst>
     <p:sldId id="256" r:id="rId2"/>
     <p:sldId id="258" r:id="rId3"/>
@@ -121,6 +124,440 @@
 </p:presentation>
 </file>
 
+<file path=ppt/notesMasters/notesMaster1.xml><?xml version="1.0" encoding="utf-8"?>
+<p:notesMaster xmlns:a="http://schemas.openxmlformats.org/drawingml/2006/main" xmlns:r="http://schemas.openxmlformats.org/officeDocument/2006/relationships" xmlns:p="http://schemas.openxmlformats.org/presentationml/2006/main">
+  <p:cSld>
+    <p:bg>
+      <p:bgRef idx="1001">
+        <a:schemeClr val="bg1"/>
+      </p:bgRef>
+    </p:bg>
+    <p:spTree>
+      <p:nvGrpSpPr>
+        <p:cNvPr id="1" name=""/>
+        <p:cNvGrpSpPr/>
+        <p:nvPr/>
+      </p:nvGrpSpPr>
+      <p:grpSpPr>
+        <a:xfrm>
+          <a:off x="0" y="0"/>
+          <a:ext cx="0" cy="0"/>
+          <a:chOff x="0" y="0"/>
+          <a:chExt cx="0" cy="0"/>
+        </a:xfrm>
+      </p:grpSpPr>
+      <p:sp>
+        <p:nvSpPr>
+          <p:cNvPr id="2" name="Header Placeholder 1"/>
+          <p:cNvSpPr>
+            <a:spLocks noGrp="1"/>
+          </p:cNvSpPr>
+          <p:nvPr>
+            <p:ph type="hdr" sz="quarter"/>
+          </p:nvPr>
+        </p:nvSpPr>
+        <p:spPr>
+          <a:xfrm>
+            <a:off x="0" y="0"/>
+            <a:ext cx="2971800" cy="458788"/>
+          </a:xfrm>
+          <a:prstGeom prst="rect">
+            <a:avLst/>
+          </a:prstGeom>
+        </p:spPr>
+        <p:txBody>
+          <a:bodyPr vert="horz" lIns="91440" tIns="45720" rIns="91440" bIns="45720" rtlCol="0"/>
+          <a:lstStyle>
+            <a:lvl1pPr algn="l">
+              <a:defRPr sz="1200"/>
+            </a:lvl1pPr>
+          </a:lstStyle>
+          <a:p>
+            <a:endParaRPr lang="de-DE"/>
+          </a:p>
+        </p:txBody>
+      </p:sp>
+      <p:sp>
+        <p:nvSpPr>
+          <p:cNvPr id="3" name="Date Placeholder 2"/>
+          <p:cNvSpPr>
+            <a:spLocks noGrp="1"/>
+          </p:cNvSpPr>
+          <p:nvPr>
+            <p:ph type="dt" idx="1"/>
+          </p:nvPr>
+        </p:nvSpPr>
+        <p:spPr>
+          <a:xfrm>
+            <a:off x="3884613" y="0"/>
+            <a:ext cx="2971800" cy="458788"/>
+          </a:xfrm>
+          <a:prstGeom prst="rect">
+            <a:avLst/>
+          </a:prstGeom>
+        </p:spPr>
+        <p:txBody>
+          <a:bodyPr vert="horz" lIns="91440" tIns="45720" rIns="91440" bIns="45720" rtlCol="0"/>
+          <a:lstStyle>
+            <a:lvl1pPr algn="r">
+              <a:defRPr sz="1200"/>
+            </a:lvl1pPr>
+          </a:lstStyle>
+          <a:p>
+            <a:fld id="{A0BC70EC-B13C-43DA-847A-8A78DD1DEEEE}" type="datetimeFigureOut">
+              <a:rPr lang="de-DE" smtClean="0"/>
+              <a:t>16.02.2023</a:t>
+            </a:fld>
+            <a:endParaRPr lang="de-DE"/>
+          </a:p>
+        </p:txBody>
+      </p:sp>
+      <p:sp>
+        <p:nvSpPr>
+          <p:cNvPr id="4" name="Slide Image Placeholder 3"/>
+          <p:cNvSpPr>
+            <a:spLocks noGrp="1" noRot="1" noChangeAspect="1"/>
+          </p:cNvSpPr>
+          <p:nvPr>
+            <p:ph type="sldImg" idx="2"/>
+          </p:nvPr>
+        </p:nvSpPr>
+        <p:spPr>
+          <a:xfrm>
+            <a:off x="685800" y="1143000"/>
+            <a:ext cx="5486400" cy="3086100"/>
+          </a:xfrm>
+          <a:prstGeom prst="rect">
+            <a:avLst/>
+          </a:prstGeom>
+          <a:noFill/>
+          <a:ln w="12700">
+            <a:solidFill>
+              <a:prstClr val="black"/>
+            </a:solidFill>
+          </a:ln>
+        </p:spPr>
+        <p:txBody>
+          <a:bodyPr vert="horz" lIns="91440" tIns="45720" rIns="91440" bIns="45720" rtlCol="0" anchor="ctr"/>
+          <a:lstStyle/>
+          <a:p>
+            <a:endParaRPr lang="de-DE"/>
+          </a:p>
+        </p:txBody>
+      </p:sp>
+      <p:sp>
+        <p:nvSpPr>
+          <p:cNvPr id="5" name="Notes Placeholder 4"/>
+          <p:cNvSpPr>
+            <a:spLocks noGrp="1"/>
+          </p:cNvSpPr>
+          <p:nvPr>
+            <p:ph type="body" sz="quarter" idx="3"/>
+          </p:nvPr>
+        </p:nvSpPr>
+        <p:spPr>
+          <a:xfrm>
+            <a:off x="685800" y="4400550"/>
+            <a:ext cx="5486400" cy="3600450"/>
+          </a:xfrm>
+          <a:prstGeom prst="rect">
+            <a:avLst/>
+          </a:prstGeom>
+        </p:spPr>
+        <p:txBody>
+          <a:bodyPr vert="horz" lIns="91440" tIns="45720" rIns="91440" bIns="45720" rtlCol="0"/>
+          <a:lstStyle/>
+          <a:p>
+            <a:pPr lvl="0"/>
+            <a:r>
+              <a:rPr lang="en-US"/>
+              <a:t>Click to edit Master text styles</a:t>
+            </a:r>
+          </a:p>
+          <a:p>
+            <a:pPr lvl="1"/>
+            <a:r>
+              <a:rPr lang="en-US"/>
+              <a:t>Second level</a:t>
+            </a:r>
+          </a:p>
+          <a:p>
+            <a:pPr lvl="2"/>
+            <a:r>
+              <a:rPr lang="en-US"/>
+              <a:t>Third level</a:t>
+            </a:r>
+          </a:p>
+          <a:p>
+            <a:pPr lvl="3"/>
+            <a:r>
+              <a:rPr lang="en-US"/>
+              <a:t>Fourth level</a:t>
+            </a:r>
+          </a:p>
+          <a:p>
+            <a:pPr lvl="4"/>
+            <a:r>
+              <a:rPr lang="en-US"/>
+              <a:t>Fifth level</a:t>
+            </a:r>
+            <a:endParaRPr lang="de-DE"/>
+          </a:p>
+        </p:txBody>
+      </p:sp>
+      <p:sp>
+        <p:nvSpPr>
+          <p:cNvPr id="6" name="Footer Placeholder 5"/>
+          <p:cNvSpPr>
+            <a:spLocks noGrp="1"/>
+          </p:cNvSpPr>
+          <p:nvPr>
+            <p:ph type="ftr" sz="quarter" idx="4"/>
+          </p:nvPr>
+        </p:nvSpPr>
+        <p:spPr>
+          <a:xfrm>
+            <a:off x="0" y="8685213"/>
+            <a:ext cx="2971800" cy="458787"/>
+          </a:xfrm>
+          <a:prstGeom prst="rect">
+            <a:avLst/>
+          </a:prstGeom>
+        </p:spPr>
+        <p:txBody>
+          <a:bodyPr vert="horz" lIns="91440" tIns="45720" rIns="91440" bIns="45720" rtlCol="0" anchor="b"/>
+          <a:lstStyle>
+            <a:lvl1pPr algn="l">
+              <a:defRPr sz="1200"/>
+            </a:lvl1pPr>
+          </a:lstStyle>
+          <a:p>
+            <a:endParaRPr lang="de-DE"/>
+          </a:p>
+        </p:txBody>
+      </p:sp>
+      <p:sp>
+        <p:nvSpPr>
+          <p:cNvPr id="7" name="Slide Number Placeholder 6"/>
+          <p:cNvSpPr>
+            <a:spLocks noGrp="1"/>
+          </p:cNvSpPr>
+          <p:nvPr>
+            <p:ph type="sldNum" sz="quarter" idx="5"/>
+          </p:nvPr>
+        </p:nvSpPr>
+        <p:spPr>
+          <a:xfrm>
+            <a:off x="3884613" y="8685213"/>
+            <a:ext cx="2971800" cy="458787"/>
+          </a:xfrm>
+          <a:prstGeom prst="rect">
+            <a:avLst/>
+          </a:prstGeom>
+        </p:spPr>
+        <p:txBody>
+          <a:bodyPr vert="horz" lIns="91440" tIns="45720" rIns="91440" bIns="45720" rtlCol="0" anchor="b"/>
+          <a:lstStyle>
+            <a:lvl1pPr algn="r">
+              <a:defRPr sz="1200"/>
+            </a:lvl1pPr>
+          </a:lstStyle>
+          <a:p>
+            <a:fld id="{E07891BC-AA88-4EB8-B78B-F8B7CAE97EBE}" type="slidenum">
+              <a:rPr lang="de-DE" smtClean="0"/>
+              <a:t>‹#›</a:t>
+            </a:fld>
+            <a:endParaRPr lang="de-DE"/>
+          </a:p>
+        </p:txBody>
+      </p:sp>
+    </p:spTree>
+    <p:extLst>
+      <p:ext uri="{BB962C8B-B14F-4D97-AF65-F5344CB8AC3E}">
+        <p14:creationId xmlns:p14="http://schemas.microsoft.com/office/powerpoint/2010/main" val="696707280"/>
+      </p:ext>
+    </p:extLst>
+  </p:cSld>
+  <p:clrMap bg1="lt1" tx1="dk1" bg2="lt2" tx2="dk2" accent1="accent1" accent2="accent2" accent3="accent3" accent4="accent4" accent5="accent5" accent6="accent6" hlink="hlink" folHlink="folHlink"/>
+  <p:notesStyle>
+    <a:lvl1pPr marL="0" algn="l" defTabSz="914400" rtl="0" eaLnBrk="1" latinLnBrk="0" hangingPunct="1">
+      <a:defRPr sz="1200" kern="1200">
+        <a:solidFill>
+          <a:schemeClr val="tx1"/>
+        </a:solidFill>
+        <a:latin typeface="+mn-lt"/>
+        <a:ea typeface="+mn-ea"/>
+        <a:cs typeface="+mn-cs"/>
+      </a:defRPr>
+    </a:lvl1pPr>
+    <a:lvl2pPr marL="457200" algn="l" defTabSz="914400" rtl="0" eaLnBrk="1" latinLnBrk="0" hangingPunct="1">
+      <a:defRPr sz="1200" kern="1200">
+        <a:solidFill>
+          <a:schemeClr val="tx1"/>
+        </a:solidFill>
+        <a:latin typeface="+mn-lt"/>
+        <a:ea typeface="+mn-ea"/>
+        <a:cs typeface="+mn-cs"/>
+      </a:defRPr>
+    </a:lvl2pPr>
+    <a:lvl3pPr marL="914400" algn="l" defTabSz="914400" rtl="0" eaLnBrk="1" latinLnBrk="0" hangingPunct="1">
+      <a:defRPr sz="1200" kern="1200">
+        <a:solidFill>
+          <a:schemeClr val="tx1"/>
+        </a:solidFill>
+        <a:latin typeface="+mn-lt"/>
+        <a:ea typeface="+mn-ea"/>
+        <a:cs typeface="+mn-cs"/>
+      </a:defRPr>
+    </a:lvl3pPr>
+    <a:lvl4pPr marL="1371600" algn="l" defTabSz="914400" rtl="0" eaLnBrk="1" latinLnBrk="0" hangingPunct="1">
+      <a:defRPr sz="1200" kern="1200">
+        <a:solidFill>
+          <a:schemeClr val="tx1"/>
+        </a:solidFill>
+        <a:latin typeface="+mn-lt"/>
+        <a:ea typeface="+mn-ea"/>
+        <a:cs typeface="+mn-cs"/>
+      </a:defRPr>
+    </a:lvl4pPr>
+    <a:lvl5pPr marL="1828800" algn="l" defTabSz="914400" rtl="0" eaLnBrk="1" latinLnBrk="0" hangingPunct="1">
+      <a:defRPr sz="1200" kern="1200">
+        <a:solidFill>
+          <a:schemeClr val="tx1"/>
+        </a:solidFill>
+        <a:latin typeface="+mn-lt"/>
+        <a:ea typeface="+mn-ea"/>
+        <a:cs typeface="+mn-cs"/>
+      </a:defRPr>
+    </a:lvl5pPr>
+    <a:lvl6pPr marL="2286000" algn="l" defTabSz="914400" rtl="0" eaLnBrk="1" latinLnBrk="0" hangingPunct="1">
+      <a:defRPr sz="1200" kern="1200">
+        <a:solidFill>
+          <a:schemeClr val="tx1"/>
+        </a:solidFill>
+        <a:latin typeface="+mn-lt"/>
+        <a:ea typeface="+mn-ea"/>
+        <a:cs typeface="+mn-cs"/>
+      </a:defRPr>
+    </a:lvl6pPr>
+    <a:lvl7pPr marL="2743200" algn="l" defTabSz="914400" rtl="0" eaLnBrk="1" latinLnBrk="0" hangingPunct="1">
+      <a:defRPr sz="1200" kern="1200">
+        <a:solidFill>
+          <a:schemeClr val="tx1"/>
+        </a:solidFill>
+        <a:latin typeface="+mn-lt"/>
+        <a:ea typeface="+mn-ea"/>
+        <a:cs typeface="+mn-cs"/>
+      </a:defRPr>
+    </a:lvl7pPr>
+    <a:lvl8pPr marL="3200400" algn="l" defTabSz="914400" rtl="0" eaLnBrk="1" latinLnBrk="0" hangingPunct="1">
+      <a:defRPr sz="1200" kern="1200">
+        <a:solidFill>
+          <a:schemeClr val="tx1"/>
+        </a:solidFill>
+        <a:latin typeface="+mn-lt"/>
+        <a:ea typeface="+mn-ea"/>
+        <a:cs typeface="+mn-cs"/>
+      </a:defRPr>
+    </a:lvl8pPr>
+    <a:lvl9pPr marL="3657600" algn="l" defTabSz="914400" rtl="0" eaLnBrk="1" latinLnBrk="0" hangingPunct="1">
+      <a:defRPr sz="1200" kern="1200">
+        <a:solidFill>
+          <a:schemeClr val="tx1"/>
+        </a:solidFill>
+        <a:latin typeface="+mn-lt"/>
+        <a:ea typeface="+mn-ea"/>
+        <a:cs typeface="+mn-cs"/>
+      </a:defRPr>
+    </a:lvl9pPr>
+  </p:notesStyle>
+</p:notesMaster>
+</file>
+
+<file path=ppt/notesSlides/notesSlide1.xml><?xml version="1.0" encoding="utf-8"?>
+<p:notes xmlns:a="http://schemas.openxmlformats.org/drawingml/2006/main" xmlns:r="http://schemas.openxmlformats.org/officeDocument/2006/relationships" xmlns:p="http://schemas.openxmlformats.org/presentationml/2006/main">
+  <p:cSld>
+    <p:spTree>
+      <p:nvGrpSpPr>
+        <p:cNvPr id="1" name=""/>
+        <p:cNvGrpSpPr/>
+        <p:nvPr/>
+      </p:nvGrpSpPr>
+      <p:grpSpPr>
+        <a:xfrm>
+          <a:off x="0" y="0"/>
+          <a:ext cx="0" cy="0"/>
+          <a:chOff x="0" y="0"/>
+          <a:chExt cx="0" cy="0"/>
+        </a:xfrm>
+      </p:grpSpPr>
+      <p:sp>
+        <p:nvSpPr>
+          <p:cNvPr id="2" name="Slide Image Placeholder 1"/>
+          <p:cNvSpPr>
+            <a:spLocks noGrp="1" noRot="1" noChangeAspect="1"/>
+          </p:cNvSpPr>
+          <p:nvPr>
+            <p:ph type="sldImg"/>
+          </p:nvPr>
+        </p:nvSpPr>
+        <p:spPr/>
+      </p:sp>
+      <p:sp>
+        <p:nvSpPr>
+          <p:cNvPr id="3" name="Notes Placeholder 2"/>
+          <p:cNvSpPr>
+            <a:spLocks noGrp="1"/>
+          </p:cNvSpPr>
+          <p:nvPr>
+            <p:ph type="body" idx="1"/>
+          </p:nvPr>
+        </p:nvSpPr>
+        <p:spPr/>
+        <p:txBody>
+          <a:bodyPr/>
+          <a:lstStyle/>
+          <a:p>
+            <a:endParaRPr lang="de-DE" dirty="0"/>
+          </a:p>
+        </p:txBody>
+      </p:sp>
+      <p:sp>
+        <p:nvSpPr>
+          <p:cNvPr id="4" name="Slide Number Placeholder 3"/>
+          <p:cNvSpPr>
+            <a:spLocks noGrp="1"/>
+          </p:cNvSpPr>
+          <p:nvPr>
+            <p:ph type="sldNum" sz="quarter" idx="5"/>
+          </p:nvPr>
+        </p:nvSpPr>
+        <p:spPr/>
+        <p:txBody>
+          <a:bodyPr/>
+          <a:lstStyle/>
+          <a:p>
+            <a:fld id="{E07891BC-AA88-4EB8-B78B-F8B7CAE97EBE}" type="slidenum">
+              <a:rPr lang="de-DE" smtClean="0"/>
+              <a:t>4</a:t>
+            </a:fld>
+            <a:endParaRPr lang="de-DE"/>
+          </a:p>
+        </p:txBody>
+      </p:sp>
+    </p:spTree>
+    <p:extLst>
+      <p:ext uri="{BB962C8B-B14F-4D97-AF65-F5344CB8AC3E}">
+        <p14:creationId xmlns:p14="http://schemas.microsoft.com/office/powerpoint/2010/main" val="1963487078"/>
+      </p:ext>
+    </p:extLst>
+  </p:cSld>
+  <p:clrMapOvr>
+    <a:masterClrMapping/>
+  </p:clrMapOvr>
+</p:notes>
+</file>
+
 <file path=ppt/slideLayouts/slideLayout1.xml><?xml version="1.0" encoding="utf-8"?>
 <p:sldLayout xmlns:a="http://schemas.openxmlformats.org/drawingml/2006/main" xmlns:r="http://schemas.openxmlformats.org/officeDocument/2006/relationships" xmlns:p="http://schemas.openxmlformats.org/presentationml/2006/main" type="title" preserve="1">
   <p:cSld name="Title Slide">
@@ -270,7 +707,7 @@
           <a:p>
             <a:fld id="{11055433-DDDA-1147-A71A-BE0AE55CB161}" type="datetimeFigureOut">
               <a:rPr lang="en-DE" smtClean="0"/>
-              <a:t>01/24/2022</a:t>
+              <a:t>16/02/2023</a:t>
             </a:fld>
             <a:endParaRPr lang="en-DE"/>
           </a:p>
@@ -470,7 +907,7 @@
           <a:p>
             <a:fld id="{11055433-DDDA-1147-A71A-BE0AE55CB161}" type="datetimeFigureOut">
               <a:rPr lang="en-DE" smtClean="0"/>
-              <a:t>01/24/2022</a:t>
+              <a:t>16/02/2023</a:t>
             </a:fld>
             <a:endParaRPr lang="en-DE"/>
           </a:p>
@@ -680,7 +1117,7 @@
           <a:p>
             <a:fld id="{11055433-DDDA-1147-A71A-BE0AE55CB161}" type="datetimeFigureOut">
               <a:rPr lang="en-DE" smtClean="0"/>
-              <a:t>01/24/2022</a:t>
+              <a:t>16/02/2023</a:t>
             </a:fld>
             <a:endParaRPr lang="en-DE"/>
           </a:p>
@@ -880,7 +1317,7 @@
           <a:p>
             <a:fld id="{6108F170-7087-4325-8F5D-6140410ED24A}" type="datetimeFigureOut">
               <a:rPr lang="de-DE" smtClean="0"/>
-              <a:t>24.01.2022</a:t>
+              <a:t>16.02.2023</a:t>
             </a:fld>
             <a:endParaRPr lang="de-DE"/>
           </a:p>
@@ -1186,7 +1623,7 @@
           <a:p>
             <a:fld id="{11055433-DDDA-1147-A71A-BE0AE55CB161}" type="datetimeFigureOut">
               <a:rPr lang="en-DE" smtClean="0"/>
-              <a:t>01/24/2022</a:t>
+              <a:t>16/02/2023</a:t>
             </a:fld>
             <a:endParaRPr lang="en-DE"/>
           </a:p>
@@ -1454,7 +1891,7 @@
           <a:p>
             <a:fld id="{11055433-DDDA-1147-A71A-BE0AE55CB161}" type="datetimeFigureOut">
               <a:rPr lang="en-DE" smtClean="0"/>
-              <a:t>01/24/2022</a:t>
+              <a:t>16/02/2023</a:t>
             </a:fld>
             <a:endParaRPr lang="en-DE"/>
           </a:p>
@@ -1869,7 +2306,7 @@
           <a:p>
             <a:fld id="{11055433-DDDA-1147-A71A-BE0AE55CB161}" type="datetimeFigureOut">
               <a:rPr lang="en-DE" smtClean="0"/>
-              <a:t>01/24/2022</a:t>
+              <a:t>16/02/2023</a:t>
             </a:fld>
             <a:endParaRPr lang="en-DE"/>
           </a:p>
@@ -2011,7 +2448,7 @@
           <a:p>
             <a:fld id="{11055433-DDDA-1147-A71A-BE0AE55CB161}" type="datetimeFigureOut">
               <a:rPr lang="en-DE" smtClean="0"/>
-              <a:t>01/24/2022</a:t>
+              <a:t>16/02/2023</a:t>
             </a:fld>
             <a:endParaRPr lang="en-DE"/>
           </a:p>
@@ -2124,7 +2561,7 @@
           <a:p>
             <a:fld id="{11055433-DDDA-1147-A71A-BE0AE55CB161}" type="datetimeFigureOut">
               <a:rPr lang="en-DE" smtClean="0"/>
-              <a:t>01/24/2022</a:t>
+              <a:t>16/02/2023</a:t>
             </a:fld>
             <a:endParaRPr lang="en-DE"/>
           </a:p>
@@ -2437,7 +2874,7 @@
           <a:p>
             <a:fld id="{11055433-DDDA-1147-A71A-BE0AE55CB161}" type="datetimeFigureOut">
               <a:rPr lang="en-DE" smtClean="0"/>
-              <a:t>01/24/2022</a:t>
+              <a:t>16/02/2023</a:t>
             </a:fld>
             <a:endParaRPr lang="en-DE"/>
           </a:p>
@@ -2726,7 +3163,7 @@
           <a:p>
             <a:fld id="{11055433-DDDA-1147-A71A-BE0AE55CB161}" type="datetimeFigureOut">
               <a:rPr lang="en-DE" smtClean="0"/>
-              <a:t>01/24/2022</a:t>
+              <a:t>16/02/2023</a:t>
             </a:fld>
             <a:endParaRPr lang="en-DE"/>
           </a:p>
@@ -2969,7 +3406,7 @@
           <a:p>
             <a:fld id="{11055433-DDDA-1147-A71A-BE0AE55CB161}" type="datetimeFigureOut">
               <a:rPr lang="en-DE" smtClean="0"/>
-              <a:t>01/24/2022</a:t>
+              <a:t>16/02/2023</a:t>
             </a:fld>
             <a:endParaRPr lang="en-DE"/>
           </a:p>
@@ -5478,2886 +5915,6 @@
           <a:chExt cx="0" cy="0"/>
         </a:xfrm>
       </p:grpSpPr>
-      <p:sp>
-        <p:nvSpPr>
-          <p:cNvPr id="4" name="Rechteck 9">
-            <a:extLst>
-              <a:ext uri="{FF2B5EF4-FFF2-40B4-BE49-F238E27FC236}">
-                <a16:creationId xmlns:a16="http://schemas.microsoft.com/office/drawing/2014/main" id="{843DC14A-BA69-7D46-ACB3-B95EC3790DCE}"/>
-              </a:ext>
-            </a:extLst>
-          </p:cNvPr>
-          <p:cNvSpPr/>
-          <p:nvPr/>
-        </p:nvSpPr>
-        <p:spPr>
-          <a:xfrm>
-            <a:off x="1581482" y="1114573"/>
-            <a:ext cx="4796265" cy="4968176"/>
-          </a:xfrm>
-          <a:prstGeom prst="rect">
-            <a:avLst/>
-          </a:prstGeom>
-          <a:solidFill>
-            <a:schemeClr val="accent5">
-              <a:lumMod val="20000"/>
-              <a:lumOff val="80000"/>
-            </a:schemeClr>
-          </a:solidFill>
-          <a:ln w="19050" cap="rnd">
-            <a:solidFill>
-              <a:srgbClr val="0092D1"/>
-            </a:solidFill>
-          </a:ln>
-        </p:spPr>
-        <p:style>
-          <a:lnRef idx="2">
-            <a:schemeClr val="accent1">
-              <a:shade val="50000"/>
-            </a:schemeClr>
-          </a:lnRef>
-          <a:fillRef idx="1">
-            <a:schemeClr val="accent1"/>
-          </a:fillRef>
-          <a:effectRef idx="0">
-            <a:schemeClr val="accent1"/>
-          </a:effectRef>
-          <a:fontRef idx="minor">
-            <a:schemeClr val="lt1"/>
-          </a:fontRef>
-        </p:style>
-        <p:txBody>
-          <a:bodyPr lIns="71981" tIns="71981" rIns="71981" bIns="71981" rtlCol="0" anchor="t"/>
-          <a:lstStyle/>
-          <a:p>
-            <a:r>
-              <a:rPr lang="en-US" sz="1000" b="1" dirty="0">
-                <a:solidFill>
-                  <a:schemeClr val="accent5"/>
-                </a:solidFill>
-              </a:rPr>
-              <a:t>Partner Provider Subaccount</a:t>
-            </a:r>
-          </a:p>
-          <a:p>
-            <a:endParaRPr lang="en-US" sz="1200" b="1" dirty="0">
-              <a:solidFill>
-                <a:srgbClr val="0092D1"/>
-              </a:solidFill>
-            </a:endParaRPr>
-          </a:p>
-        </p:txBody>
-      </p:sp>
-      <p:sp>
-        <p:nvSpPr>
-          <p:cNvPr id="111" name="Rechteck 61">
-            <a:extLst>
-              <a:ext uri="{FF2B5EF4-FFF2-40B4-BE49-F238E27FC236}">
-                <a16:creationId xmlns:a16="http://schemas.microsoft.com/office/drawing/2014/main" id="{E94B390B-17F9-6642-9EEF-27DB5F7B5DCB}"/>
-              </a:ext>
-            </a:extLst>
-          </p:cNvPr>
-          <p:cNvSpPr/>
-          <p:nvPr/>
-        </p:nvSpPr>
-        <p:spPr>
-          <a:xfrm>
-            <a:off x="4424091" y="2770932"/>
-            <a:ext cx="1041317" cy="456045"/>
-          </a:xfrm>
-          <a:prstGeom prst="rect">
-            <a:avLst/>
-          </a:prstGeom>
-          <a:solidFill>
-            <a:schemeClr val="bg1"/>
-          </a:solidFill>
-          <a:ln w="12700">
-            <a:solidFill>
-              <a:srgbClr val="1A9898"/>
-            </a:solidFill>
-          </a:ln>
-          <a:effectLst/>
-        </p:spPr>
-        <p:style>
-          <a:lnRef idx="2">
-            <a:schemeClr val="accent1">
-              <a:shade val="50000"/>
-            </a:schemeClr>
-          </a:lnRef>
-          <a:fillRef idx="1">
-            <a:schemeClr val="accent1"/>
-          </a:fillRef>
-          <a:effectRef idx="0">
-            <a:schemeClr val="accent1"/>
-          </a:effectRef>
-          <a:fontRef idx="minor">
-            <a:schemeClr val="lt1"/>
-          </a:fontRef>
-        </p:style>
-        <p:txBody>
-          <a:bodyPr lIns="72000" tIns="72000" rIns="72000" bIns="72000" rtlCol="0" anchor="ctr" anchorCtr="0"/>
-          <a:lstStyle/>
-          <a:p>
-            <a:pPr algn="ctr"/>
-            <a:r>
-              <a:rPr lang="en-US" sz="800" kern="0" dirty="0">
-                <a:solidFill>
-                  <a:schemeClr val="tx1"/>
-                </a:solidFill>
-                <a:latin typeface="Arial" panose="020B0604020202020204" pitchFamily="34" charset="0"/>
-                <a:ea typeface="BentonSans Bold" charset="0"/>
-                <a:cs typeface="Arial" panose="020B0604020202020204" pitchFamily="34" charset="0"/>
-              </a:rPr>
-              <a:t>Microservices</a:t>
-            </a:r>
-          </a:p>
-        </p:txBody>
-      </p:sp>
-      <p:sp>
-        <p:nvSpPr>
-          <p:cNvPr id="110" name="Rechteck 61">
-            <a:extLst>
-              <a:ext uri="{FF2B5EF4-FFF2-40B4-BE49-F238E27FC236}">
-                <a16:creationId xmlns:a16="http://schemas.microsoft.com/office/drawing/2014/main" id="{98CFA3E7-E688-9045-ACB8-BEC926C6AB70}"/>
-              </a:ext>
-            </a:extLst>
-          </p:cNvPr>
-          <p:cNvSpPr/>
-          <p:nvPr/>
-        </p:nvSpPr>
-        <p:spPr>
-          <a:xfrm>
-            <a:off x="4353401" y="2699668"/>
-            <a:ext cx="1041317" cy="456045"/>
-          </a:xfrm>
-          <a:prstGeom prst="rect">
-            <a:avLst/>
-          </a:prstGeom>
-          <a:solidFill>
-            <a:schemeClr val="bg1"/>
-          </a:solidFill>
-          <a:ln w="12700">
-            <a:solidFill>
-              <a:srgbClr val="1A9898"/>
-            </a:solidFill>
-          </a:ln>
-          <a:effectLst/>
-        </p:spPr>
-        <p:style>
-          <a:lnRef idx="2">
-            <a:schemeClr val="accent1">
-              <a:shade val="50000"/>
-            </a:schemeClr>
-          </a:lnRef>
-          <a:fillRef idx="1">
-            <a:schemeClr val="accent1"/>
-          </a:fillRef>
-          <a:effectRef idx="0">
-            <a:schemeClr val="accent1"/>
-          </a:effectRef>
-          <a:fontRef idx="minor">
-            <a:schemeClr val="lt1"/>
-          </a:fontRef>
-        </p:style>
-        <p:txBody>
-          <a:bodyPr lIns="72000" tIns="72000" rIns="72000" bIns="72000" rtlCol="0" anchor="ctr" anchorCtr="0"/>
-          <a:lstStyle/>
-          <a:p>
-            <a:pPr algn="ctr"/>
-            <a:r>
-              <a:rPr lang="en-US" sz="800" kern="0" dirty="0">
-                <a:solidFill>
-                  <a:schemeClr val="tx1"/>
-                </a:solidFill>
-                <a:latin typeface="Arial" panose="020B0604020202020204" pitchFamily="34" charset="0"/>
-                <a:ea typeface="BentonSans Bold" charset="0"/>
-                <a:cs typeface="Arial" panose="020B0604020202020204" pitchFamily="34" charset="0"/>
-              </a:rPr>
-              <a:t>Microservices</a:t>
-            </a:r>
-          </a:p>
-        </p:txBody>
-      </p:sp>
-      <p:sp>
-        <p:nvSpPr>
-          <p:cNvPr id="109" name="Rechteck 61">
-            <a:extLst>
-              <a:ext uri="{FF2B5EF4-FFF2-40B4-BE49-F238E27FC236}">
-                <a16:creationId xmlns:a16="http://schemas.microsoft.com/office/drawing/2014/main" id="{660CFAA2-5780-2244-ABEC-8083A196E164}"/>
-              </a:ext>
-            </a:extLst>
-          </p:cNvPr>
-          <p:cNvSpPr/>
-          <p:nvPr/>
-        </p:nvSpPr>
-        <p:spPr>
-          <a:xfrm>
-            <a:off x="4281399" y="2627108"/>
-            <a:ext cx="1041317" cy="456045"/>
-          </a:xfrm>
-          <a:prstGeom prst="rect">
-            <a:avLst/>
-          </a:prstGeom>
-          <a:solidFill>
-            <a:schemeClr val="bg1"/>
-          </a:solidFill>
-          <a:ln w="12700">
-            <a:solidFill>
-              <a:srgbClr val="1A9898"/>
-            </a:solidFill>
-          </a:ln>
-          <a:effectLst/>
-        </p:spPr>
-        <p:style>
-          <a:lnRef idx="2">
-            <a:schemeClr val="accent1">
-              <a:shade val="50000"/>
-            </a:schemeClr>
-          </a:lnRef>
-          <a:fillRef idx="1">
-            <a:schemeClr val="accent1"/>
-          </a:fillRef>
-          <a:effectRef idx="0">
-            <a:schemeClr val="accent1"/>
-          </a:effectRef>
-          <a:fontRef idx="minor">
-            <a:schemeClr val="lt1"/>
-          </a:fontRef>
-        </p:style>
-        <p:txBody>
-          <a:bodyPr lIns="72000" tIns="72000" rIns="72000" bIns="72000" rtlCol="0" anchor="ctr" anchorCtr="0"/>
-          <a:lstStyle/>
-          <a:p>
-            <a:pPr algn="ctr"/>
-            <a:r>
-              <a:rPr lang="en-US" sz="800" kern="0" dirty="0">
-                <a:solidFill>
-                  <a:schemeClr val="tx1"/>
-                </a:solidFill>
-                <a:latin typeface="Arial" panose="020B0604020202020204" pitchFamily="34" charset="0"/>
-                <a:ea typeface="BentonSans Bold" charset="0"/>
-                <a:cs typeface="Arial" panose="020B0604020202020204" pitchFamily="34" charset="0"/>
-              </a:rPr>
-              <a:t>Microservices</a:t>
-            </a:r>
-          </a:p>
-        </p:txBody>
-      </p:sp>
-      <p:sp>
-        <p:nvSpPr>
-          <p:cNvPr id="108" name="Rechteck 61">
-            <a:extLst>
-              <a:ext uri="{FF2B5EF4-FFF2-40B4-BE49-F238E27FC236}">
-                <a16:creationId xmlns:a16="http://schemas.microsoft.com/office/drawing/2014/main" id="{37DA8C0E-F749-7440-A59E-5B6957C2DDB2}"/>
-              </a:ext>
-            </a:extLst>
-          </p:cNvPr>
-          <p:cNvSpPr/>
-          <p:nvPr/>
-        </p:nvSpPr>
-        <p:spPr>
-          <a:xfrm>
-            <a:off x="4281399" y="2627108"/>
-            <a:ext cx="1041317" cy="456045"/>
-          </a:xfrm>
-          <a:prstGeom prst="rect">
-            <a:avLst/>
-          </a:prstGeom>
-          <a:solidFill>
-            <a:schemeClr val="bg1"/>
-          </a:solidFill>
-          <a:ln w="12700">
-            <a:solidFill>
-              <a:srgbClr val="1A9898"/>
-            </a:solidFill>
-          </a:ln>
-          <a:effectLst/>
-        </p:spPr>
-        <p:style>
-          <a:lnRef idx="2">
-            <a:schemeClr val="accent1">
-              <a:shade val="50000"/>
-            </a:schemeClr>
-          </a:lnRef>
-          <a:fillRef idx="1">
-            <a:schemeClr val="accent1"/>
-          </a:fillRef>
-          <a:effectRef idx="0">
-            <a:schemeClr val="accent1"/>
-          </a:effectRef>
-          <a:fontRef idx="minor">
-            <a:schemeClr val="lt1"/>
-          </a:fontRef>
-        </p:style>
-        <p:txBody>
-          <a:bodyPr lIns="72000" tIns="72000" rIns="72000" bIns="72000" rtlCol="0" anchor="ctr" anchorCtr="0"/>
-          <a:lstStyle/>
-          <a:p>
-            <a:pPr algn="ctr"/>
-            <a:r>
-              <a:rPr lang="en-US" sz="800" kern="0" dirty="0">
-                <a:solidFill>
-                  <a:schemeClr val="tx1"/>
-                </a:solidFill>
-                <a:latin typeface="Arial" panose="020B0604020202020204" pitchFamily="34" charset="0"/>
-                <a:ea typeface="BentonSans Bold" charset="0"/>
-                <a:cs typeface="Arial" panose="020B0604020202020204" pitchFamily="34" charset="0"/>
-              </a:rPr>
-              <a:t>Microservices</a:t>
-            </a:r>
-          </a:p>
-        </p:txBody>
-      </p:sp>
-      <p:sp>
-        <p:nvSpPr>
-          <p:cNvPr id="107" name="Rechteck 61">
-            <a:extLst>
-              <a:ext uri="{FF2B5EF4-FFF2-40B4-BE49-F238E27FC236}">
-                <a16:creationId xmlns:a16="http://schemas.microsoft.com/office/drawing/2014/main" id="{49CEF7C3-AFBB-B24B-8BA7-092C02554C2E}"/>
-              </a:ext>
-            </a:extLst>
-          </p:cNvPr>
-          <p:cNvSpPr/>
-          <p:nvPr/>
-        </p:nvSpPr>
-        <p:spPr>
-          <a:xfrm>
-            <a:off x="4281399" y="2627108"/>
-            <a:ext cx="1041317" cy="456045"/>
-          </a:xfrm>
-          <a:prstGeom prst="rect">
-            <a:avLst/>
-          </a:prstGeom>
-          <a:solidFill>
-            <a:schemeClr val="bg1"/>
-          </a:solidFill>
-          <a:ln w="12700">
-            <a:solidFill>
-              <a:srgbClr val="1A9898"/>
-            </a:solidFill>
-          </a:ln>
-          <a:effectLst/>
-        </p:spPr>
-        <p:style>
-          <a:lnRef idx="2">
-            <a:schemeClr val="accent1">
-              <a:shade val="50000"/>
-            </a:schemeClr>
-          </a:lnRef>
-          <a:fillRef idx="1">
-            <a:schemeClr val="accent1"/>
-          </a:fillRef>
-          <a:effectRef idx="0">
-            <a:schemeClr val="accent1"/>
-          </a:effectRef>
-          <a:fontRef idx="minor">
-            <a:schemeClr val="lt1"/>
-          </a:fontRef>
-        </p:style>
-        <p:txBody>
-          <a:bodyPr lIns="72000" tIns="72000" rIns="72000" bIns="72000" rtlCol="0" anchor="ctr" anchorCtr="0"/>
-          <a:lstStyle/>
-          <a:p>
-            <a:pPr algn="ctr"/>
-            <a:r>
-              <a:rPr lang="en-US" sz="800" kern="0" dirty="0">
-                <a:solidFill>
-                  <a:schemeClr val="tx1"/>
-                </a:solidFill>
-                <a:latin typeface="Arial" panose="020B0604020202020204" pitchFamily="34" charset="0"/>
-                <a:ea typeface="BentonSans Bold" charset="0"/>
-                <a:cs typeface="Arial" panose="020B0604020202020204" pitchFamily="34" charset="0"/>
-              </a:rPr>
-              <a:t>Microservices</a:t>
-            </a:r>
-          </a:p>
-        </p:txBody>
-      </p:sp>
-      <p:sp>
-        <p:nvSpPr>
-          <p:cNvPr id="15" name="Rechteck 9">
-            <a:extLst>
-              <a:ext uri="{FF2B5EF4-FFF2-40B4-BE49-F238E27FC236}">
-                <a16:creationId xmlns:a16="http://schemas.microsoft.com/office/drawing/2014/main" id="{74C4F2F1-BC7B-F346-ADFF-7430EE28ACC0}"/>
-              </a:ext>
-            </a:extLst>
-          </p:cNvPr>
-          <p:cNvSpPr/>
-          <p:nvPr/>
-        </p:nvSpPr>
-        <p:spPr>
-          <a:xfrm>
-            <a:off x="6387547" y="1114573"/>
-            <a:ext cx="3299792" cy="2362685"/>
-          </a:xfrm>
-          <a:prstGeom prst="rect">
-            <a:avLst/>
-          </a:prstGeom>
-          <a:solidFill>
-            <a:schemeClr val="accent5">
-              <a:lumMod val="20000"/>
-              <a:lumOff val="80000"/>
-            </a:schemeClr>
-          </a:solidFill>
-          <a:ln w="19050" cap="rnd">
-            <a:solidFill>
-              <a:srgbClr val="0092D1"/>
-            </a:solidFill>
-          </a:ln>
-        </p:spPr>
-        <p:style>
-          <a:lnRef idx="2">
-            <a:schemeClr val="accent1">
-              <a:shade val="50000"/>
-            </a:schemeClr>
-          </a:lnRef>
-          <a:fillRef idx="1">
-            <a:schemeClr val="accent1"/>
-          </a:fillRef>
-          <a:effectRef idx="0">
-            <a:schemeClr val="accent1"/>
-          </a:effectRef>
-          <a:fontRef idx="minor">
-            <a:schemeClr val="lt1"/>
-          </a:fontRef>
-        </p:style>
-        <p:txBody>
-          <a:bodyPr lIns="71981" tIns="71981" rIns="71981" bIns="71981" rtlCol="0" anchor="t"/>
-          <a:lstStyle/>
-          <a:p>
-            <a:endParaRPr lang="en-US" sz="1200" b="1" dirty="0">
-              <a:solidFill>
-                <a:srgbClr val="0092D1"/>
-              </a:solidFill>
-            </a:endParaRPr>
-          </a:p>
-        </p:txBody>
-      </p:sp>
-      <p:sp>
-        <p:nvSpPr>
-          <p:cNvPr id="20" name="Rechteck 9">
-            <a:extLst>
-              <a:ext uri="{FF2B5EF4-FFF2-40B4-BE49-F238E27FC236}">
-                <a16:creationId xmlns:a16="http://schemas.microsoft.com/office/drawing/2014/main" id="{AF7E6466-972D-964A-ACAD-0F38F86D6C70}"/>
-              </a:ext>
-            </a:extLst>
-          </p:cNvPr>
-          <p:cNvSpPr/>
-          <p:nvPr/>
-        </p:nvSpPr>
-        <p:spPr>
-          <a:xfrm>
-            <a:off x="6913065" y="4253949"/>
-            <a:ext cx="2774274" cy="1828799"/>
-          </a:xfrm>
-          <a:prstGeom prst="rect">
-            <a:avLst/>
-          </a:prstGeom>
-          <a:solidFill>
-            <a:schemeClr val="accent5">
-              <a:lumMod val="20000"/>
-              <a:lumOff val="80000"/>
-            </a:schemeClr>
-          </a:solidFill>
-          <a:ln w="19050" cap="rnd">
-            <a:solidFill>
-              <a:srgbClr val="0092D1"/>
-            </a:solidFill>
-          </a:ln>
-        </p:spPr>
-        <p:style>
-          <a:lnRef idx="2">
-            <a:schemeClr val="accent1">
-              <a:shade val="50000"/>
-            </a:schemeClr>
-          </a:lnRef>
-          <a:fillRef idx="1">
-            <a:schemeClr val="accent1"/>
-          </a:fillRef>
-          <a:effectRef idx="0">
-            <a:schemeClr val="accent1"/>
-          </a:effectRef>
-          <a:fontRef idx="minor">
-            <a:schemeClr val="lt1"/>
-          </a:fontRef>
-        </p:style>
-        <p:txBody>
-          <a:bodyPr lIns="71981" tIns="71981" rIns="71981" bIns="71981" rtlCol="0" anchor="t"/>
-          <a:lstStyle/>
-          <a:p>
-            <a:endParaRPr lang="en-US" sz="1200" b="1" dirty="0">
-              <a:solidFill>
-                <a:srgbClr val="0092D1"/>
-              </a:solidFill>
-            </a:endParaRPr>
-          </a:p>
-        </p:txBody>
-      </p:sp>
-      <p:sp>
-        <p:nvSpPr>
-          <p:cNvPr id="19" name="Rechteck 9">
-            <a:extLst>
-              <a:ext uri="{FF2B5EF4-FFF2-40B4-BE49-F238E27FC236}">
-                <a16:creationId xmlns:a16="http://schemas.microsoft.com/office/drawing/2014/main" id="{C9064A47-D602-D44B-B78E-4A53A3C88ABA}"/>
-              </a:ext>
-            </a:extLst>
-          </p:cNvPr>
-          <p:cNvSpPr/>
-          <p:nvPr/>
-        </p:nvSpPr>
-        <p:spPr>
-          <a:xfrm>
-            <a:off x="6760665" y="4101549"/>
-            <a:ext cx="2774274" cy="1828799"/>
-          </a:xfrm>
-          <a:prstGeom prst="rect">
-            <a:avLst/>
-          </a:prstGeom>
-          <a:solidFill>
-            <a:schemeClr val="accent5">
-              <a:lumMod val="20000"/>
-              <a:lumOff val="80000"/>
-            </a:schemeClr>
-          </a:solidFill>
-          <a:ln w="19050" cap="rnd">
-            <a:solidFill>
-              <a:srgbClr val="0092D1"/>
-            </a:solidFill>
-          </a:ln>
-        </p:spPr>
-        <p:style>
-          <a:lnRef idx="2">
-            <a:schemeClr val="accent1">
-              <a:shade val="50000"/>
-            </a:schemeClr>
-          </a:lnRef>
-          <a:fillRef idx="1">
-            <a:schemeClr val="accent1"/>
-          </a:fillRef>
-          <a:effectRef idx="0">
-            <a:schemeClr val="accent1"/>
-          </a:effectRef>
-          <a:fontRef idx="minor">
-            <a:schemeClr val="lt1"/>
-          </a:fontRef>
-        </p:style>
-        <p:txBody>
-          <a:bodyPr lIns="71981" tIns="71981" rIns="71981" bIns="71981" rtlCol="0" anchor="t"/>
-          <a:lstStyle/>
-          <a:p>
-            <a:endParaRPr lang="en-US" sz="1200" b="1" dirty="0">
-              <a:solidFill>
-                <a:srgbClr val="0092D1"/>
-              </a:solidFill>
-            </a:endParaRPr>
-          </a:p>
-        </p:txBody>
-      </p:sp>
-      <p:sp>
-        <p:nvSpPr>
-          <p:cNvPr id="12" name="Rectangle 11">
-            <a:extLst>
-              <a:ext uri="{FF2B5EF4-FFF2-40B4-BE49-F238E27FC236}">
-                <a16:creationId xmlns:a16="http://schemas.microsoft.com/office/drawing/2014/main" id="{2B9831DC-6083-4B47-94EB-7CBA79C14B6C}"/>
-              </a:ext>
-            </a:extLst>
-          </p:cNvPr>
-          <p:cNvSpPr/>
-          <p:nvPr/>
-        </p:nvSpPr>
-        <p:spPr>
-          <a:xfrm>
-            <a:off x="10424435" y="722287"/>
-            <a:ext cx="1312178" cy="5579124"/>
-          </a:xfrm>
-          <a:prstGeom prst="rect">
-            <a:avLst/>
-          </a:prstGeom>
-          <a:solidFill>
-            <a:schemeClr val="bg1"/>
-          </a:solidFill>
-          <a:ln w="15875">
-            <a:solidFill>
-              <a:schemeClr val="bg1">
-                <a:lumMod val="65000"/>
-              </a:schemeClr>
-            </a:solidFill>
-            <a:prstDash val="sysDot"/>
-          </a:ln>
-        </p:spPr>
-        <p:style>
-          <a:lnRef idx="2">
-            <a:schemeClr val="accent1">
-              <a:shade val="50000"/>
-            </a:schemeClr>
-          </a:lnRef>
-          <a:fillRef idx="1">
-            <a:schemeClr val="accent1"/>
-          </a:fillRef>
-          <a:effectRef idx="0">
-            <a:schemeClr val="accent1"/>
-          </a:effectRef>
-          <a:fontRef idx="minor">
-            <a:schemeClr val="lt1"/>
-          </a:fontRef>
-        </p:style>
-        <p:txBody>
-          <a:bodyPr rtlCol="0" anchor="ctr"/>
-          <a:lstStyle/>
-          <a:p>
-            <a:pPr algn="ctr"/>
-            <a:endParaRPr lang="en-DE"/>
-          </a:p>
-        </p:txBody>
-      </p:sp>
-      <p:sp>
-        <p:nvSpPr>
-          <p:cNvPr id="11" name="Rectangle 10">
-            <a:extLst>
-              <a:ext uri="{FF2B5EF4-FFF2-40B4-BE49-F238E27FC236}">
-                <a16:creationId xmlns:a16="http://schemas.microsoft.com/office/drawing/2014/main" id="{1C9E87D4-0E3A-0F44-95A3-348AFE84F009}"/>
-              </a:ext>
-            </a:extLst>
-          </p:cNvPr>
-          <p:cNvSpPr/>
-          <p:nvPr/>
-        </p:nvSpPr>
-        <p:spPr>
-          <a:xfrm>
-            <a:off x="10344921" y="649399"/>
-            <a:ext cx="1312178" cy="5579124"/>
-          </a:xfrm>
-          <a:prstGeom prst="rect">
-            <a:avLst/>
-          </a:prstGeom>
-          <a:solidFill>
-            <a:schemeClr val="bg1"/>
-          </a:solidFill>
-          <a:ln w="15875">
-            <a:solidFill>
-              <a:schemeClr val="bg1">
-                <a:lumMod val="65000"/>
-              </a:schemeClr>
-            </a:solidFill>
-            <a:prstDash val="sysDot"/>
-          </a:ln>
-        </p:spPr>
-        <p:style>
-          <a:lnRef idx="2">
-            <a:schemeClr val="accent1">
-              <a:shade val="50000"/>
-            </a:schemeClr>
-          </a:lnRef>
-          <a:fillRef idx="1">
-            <a:schemeClr val="accent1"/>
-          </a:fillRef>
-          <a:effectRef idx="0">
-            <a:schemeClr val="accent1"/>
-          </a:effectRef>
-          <a:fontRef idx="minor">
-            <a:schemeClr val="lt1"/>
-          </a:fontRef>
-        </p:style>
-        <p:txBody>
-          <a:bodyPr rtlCol="0" anchor="ctr"/>
-          <a:lstStyle/>
-          <a:p>
-            <a:pPr algn="ctr"/>
-            <a:endParaRPr lang="en-DE"/>
-          </a:p>
-        </p:txBody>
-      </p:sp>
-      <p:sp>
-        <p:nvSpPr>
-          <p:cNvPr id="9" name="Rectangle 8">
-            <a:extLst>
-              <a:ext uri="{FF2B5EF4-FFF2-40B4-BE49-F238E27FC236}">
-                <a16:creationId xmlns:a16="http://schemas.microsoft.com/office/drawing/2014/main" id="{EAEBDF2E-E572-EE44-9BF9-4B20B314BABB}"/>
-              </a:ext>
-            </a:extLst>
-          </p:cNvPr>
-          <p:cNvSpPr/>
-          <p:nvPr/>
-        </p:nvSpPr>
-        <p:spPr>
-          <a:xfrm>
-            <a:off x="10265407" y="576511"/>
-            <a:ext cx="1312178" cy="5579124"/>
-          </a:xfrm>
-          <a:prstGeom prst="rect">
-            <a:avLst/>
-          </a:prstGeom>
-          <a:solidFill>
-            <a:schemeClr val="bg1"/>
-          </a:solidFill>
-          <a:ln w="15875">
-            <a:solidFill>
-              <a:schemeClr val="bg1">
-                <a:lumMod val="65000"/>
-              </a:schemeClr>
-            </a:solidFill>
-            <a:prstDash val="sysDot"/>
-          </a:ln>
-        </p:spPr>
-        <p:style>
-          <a:lnRef idx="2">
-            <a:schemeClr val="accent1">
-              <a:shade val="50000"/>
-            </a:schemeClr>
-          </a:lnRef>
-          <a:fillRef idx="1">
-            <a:schemeClr val="accent1"/>
-          </a:fillRef>
-          <a:effectRef idx="0">
-            <a:schemeClr val="accent1"/>
-          </a:effectRef>
-          <a:fontRef idx="minor">
-            <a:schemeClr val="lt1"/>
-          </a:fontRef>
-        </p:style>
-        <p:txBody>
-          <a:bodyPr rtlCol="0" anchor="ctr"/>
-          <a:lstStyle/>
-          <a:p>
-            <a:pPr algn="ctr"/>
-            <a:r>
-              <a:rPr lang="en-DE" sz="1000" dirty="0">
-                <a:solidFill>
-                  <a:schemeClr val="tx1"/>
-                </a:solidFill>
-              </a:rPr>
-              <a:t>SAP </a:t>
-            </a:r>
-          </a:p>
-          <a:p>
-            <a:pPr algn="ctr"/>
-            <a:r>
-              <a:rPr lang="en-DE" sz="1000" dirty="0">
-                <a:solidFill>
-                  <a:schemeClr val="tx1"/>
-                </a:solidFill>
-              </a:rPr>
-              <a:t>S/4 HANA </a:t>
-            </a:r>
-          </a:p>
-          <a:p>
-            <a:pPr algn="ctr"/>
-            <a:r>
-              <a:rPr lang="en-DE" sz="1000" dirty="0">
-                <a:solidFill>
-                  <a:schemeClr val="tx1"/>
-                </a:solidFill>
-              </a:rPr>
-              <a:t>Cloud</a:t>
-            </a:r>
-          </a:p>
-        </p:txBody>
-      </p:sp>
-      <p:sp>
-        <p:nvSpPr>
-          <p:cNvPr id="2" name="Rechteck 9">
-            <a:extLst>
-              <a:ext uri="{FF2B5EF4-FFF2-40B4-BE49-F238E27FC236}">
-                <a16:creationId xmlns:a16="http://schemas.microsoft.com/office/drawing/2014/main" id="{C07D0A0D-62AF-974E-874B-ACB6BAC14F37}"/>
-              </a:ext>
-            </a:extLst>
-          </p:cNvPr>
-          <p:cNvSpPr/>
-          <p:nvPr/>
-        </p:nvSpPr>
-        <p:spPr>
-          <a:xfrm>
-            <a:off x="1376864" y="576511"/>
-            <a:ext cx="8522053" cy="5704978"/>
-          </a:xfrm>
-          <a:prstGeom prst="rect">
-            <a:avLst/>
-          </a:prstGeom>
-          <a:noFill/>
-          <a:ln w="19050">
-            <a:solidFill>
-              <a:srgbClr val="427CAC"/>
-            </a:solidFill>
-          </a:ln>
-        </p:spPr>
-        <p:style>
-          <a:lnRef idx="2">
-            <a:schemeClr val="accent1">
-              <a:shade val="50000"/>
-            </a:schemeClr>
-          </a:lnRef>
-          <a:fillRef idx="1">
-            <a:schemeClr val="accent1"/>
-          </a:fillRef>
-          <a:effectRef idx="0">
-            <a:schemeClr val="accent1"/>
-          </a:effectRef>
-          <a:fontRef idx="minor">
-            <a:schemeClr val="lt1"/>
-          </a:fontRef>
-        </p:style>
-        <p:txBody>
-          <a:bodyPr lIns="71983" tIns="71983" rIns="71983" bIns="71983" rtlCol="0" anchor="t"/>
-          <a:lstStyle/>
-          <a:p>
-            <a:endParaRPr lang="en-US" sz="1799" b="1" dirty="0">
-              <a:solidFill>
-                <a:schemeClr val="tx1">
-                  <a:lumMod val="65000"/>
-                  <a:lumOff val="35000"/>
-                </a:schemeClr>
-              </a:solidFill>
-            </a:endParaRPr>
-          </a:p>
-        </p:txBody>
-      </p:sp>
-      <p:sp>
-        <p:nvSpPr>
-          <p:cNvPr id="3" name="TextBox 2">
-            <a:extLst>
-              <a:ext uri="{FF2B5EF4-FFF2-40B4-BE49-F238E27FC236}">
-                <a16:creationId xmlns:a16="http://schemas.microsoft.com/office/drawing/2014/main" id="{8322A7B5-D204-BF44-B2AD-294A876ADD95}"/>
-              </a:ext>
-            </a:extLst>
-          </p:cNvPr>
-          <p:cNvSpPr txBox="1"/>
-          <p:nvPr/>
-        </p:nvSpPr>
-        <p:spPr>
-          <a:xfrm>
-            <a:off x="1436499" y="673954"/>
-            <a:ext cx="2951295" cy="276999"/>
-          </a:xfrm>
-          <a:prstGeom prst="rect">
-            <a:avLst/>
-          </a:prstGeom>
-          <a:noFill/>
-        </p:spPr>
-        <p:txBody>
-          <a:bodyPr wrap="square" rtlCol="0">
-            <a:spAutoFit/>
-          </a:bodyPr>
-          <a:lstStyle/>
-          <a:p>
-            <a:r>
-              <a:rPr lang="en-DE" sz="1200" b="1" dirty="0"/>
-              <a:t>SAP BTP – Partner Global Account</a:t>
-            </a:r>
-          </a:p>
-        </p:txBody>
-      </p:sp>
-      <p:sp>
-        <p:nvSpPr>
-          <p:cNvPr id="6" name="Rectangle 5">
-            <a:extLst>
-              <a:ext uri="{FF2B5EF4-FFF2-40B4-BE49-F238E27FC236}">
-                <a16:creationId xmlns:a16="http://schemas.microsoft.com/office/drawing/2014/main" id="{21D7C2CA-BF19-AF4D-8EE8-2A63999B0C3A}"/>
-              </a:ext>
-            </a:extLst>
-          </p:cNvPr>
-          <p:cNvSpPr/>
-          <p:nvPr/>
-        </p:nvSpPr>
-        <p:spPr>
-          <a:xfrm>
-            <a:off x="10442419" y="946527"/>
-            <a:ext cx="975360" cy="5050081"/>
-          </a:xfrm>
-          <a:prstGeom prst="rect">
-            <a:avLst/>
-          </a:prstGeom>
-          <a:noFill/>
-          <a:ln>
-            <a:solidFill>
-              <a:schemeClr val="tx1"/>
-            </a:solidFill>
-          </a:ln>
-        </p:spPr>
-        <p:style>
-          <a:lnRef idx="2">
-            <a:schemeClr val="accent1">
-              <a:shade val="50000"/>
-            </a:schemeClr>
-          </a:lnRef>
-          <a:fillRef idx="1">
-            <a:schemeClr val="accent1"/>
-          </a:fillRef>
-          <a:effectRef idx="0">
-            <a:schemeClr val="accent1"/>
-          </a:effectRef>
-          <a:fontRef idx="minor">
-            <a:schemeClr val="lt1"/>
-          </a:fontRef>
-        </p:style>
-        <p:txBody>
-          <a:bodyPr rtlCol="0" anchor="ctr"/>
-          <a:lstStyle/>
-          <a:p>
-            <a:pPr algn="ctr"/>
-            <a:endParaRPr lang="en-DE"/>
-          </a:p>
-        </p:txBody>
-      </p:sp>
-      <p:sp>
-        <p:nvSpPr>
-          <p:cNvPr id="10" name="TextBox 9">
-            <a:extLst>
-              <a:ext uri="{FF2B5EF4-FFF2-40B4-BE49-F238E27FC236}">
-                <a16:creationId xmlns:a16="http://schemas.microsoft.com/office/drawing/2014/main" id="{F0C104F9-042F-064D-8FC8-33F4131EFE2F}"/>
-              </a:ext>
-            </a:extLst>
-          </p:cNvPr>
-          <p:cNvSpPr txBox="1"/>
-          <p:nvPr/>
-        </p:nvSpPr>
-        <p:spPr>
-          <a:xfrm>
-            <a:off x="10266007" y="616394"/>
-            <a:ext cx="1311578" cy="246221"/>
-          </a:xfrm>
-          <a:prstGeom prst="rect">
-            <a:avLst/>
-          </a:prstGeom>
-          <a:noFill/>
-        </p:spPr>
-        <p:txBody>
-          <a:bodyPr wrap="none" rtlCol="0">
-            <a:spAutoFit/>
-          </a:bodyPr>
-          <a:lstStyle/>
-          <a:p>
-            <a:r>
-              <a:rPr lang="en-DE" sz="1000" b="1" dirty="0">
-                <a:solidFill>
-                  <a:schemeClr val="bg1">
-                    <a:lumMod val="50000"/>
-                  </a:schemeClr>
-                </a:solidFill>
-              </a:rPr>
-              <a:t>Customer landscapes</a:t>
-            </a:r>
-          </a:p>
-        </p:txBody>
-      </p:sp>
-      <p:sp>
-        <p:nvSpPr>
-          <p:cNvPr id="13" name="Abgerundetes Rechteck 30">
-            <a:extLst>
-              <a:ext uri="{FF2B5EF4-FFF2-40B4-BE49-F238E27FC236}">
-                <a16:creationId xmlns:a16="http://schemas.microsoft.com/office/drawing/2014/main" id="{C1A2AA0B-3092-A74E-8B54-6707F6BABB9B}"/>
-              </a:ext>
-            </a:extLst>
-          </p:cNvPr>
-          <p:cNvSpPr/>
-          <p:nvPr/>
-        </p:nvSpPr>
-        <p:spPr>
-          <a:xfrm>
-            <a:off x="313236" y="3628560"/>
-            <a:ext cx="773607" cy="309486"/>
-          </a:xfrm>
-          <a:prstGeom prst="roundRect">
-            <a:avLst>
-              <a:gd name="adj" fmla="val 4078"/>
-            </a:avLst>
-          </a:prstGeom>
-          <a:noFill/>
-          <a:ln w="28575">
-            <a:noFill/>
-          </a:ln>
-        </p:spPr>
-        <p:style>
-          <a:lnRef idx="2">
-            <a:schemeClr val="accent1">
-              <a:shade val="50000"/>
-            </a:schemeClr>
-          </a:lnRef>
-          <a:fillRef idx="1">
-            <a:schemeClr val="accent1"/>
-          </a:fillRef>
-          <a:effectRef idx="0">
-            <a:schemeClr val="accent1"/>
-          </a:effectRef>
-          <a:fontRef idx="minor">
-            <a:schemeClr val="lt1"/>
-          </a:fontRef>
-        </p:style>
-        <p:txBody>
-          <a:bodyPr lIns="35982" tIns="35982" rIns="35982" bIns="35982" rtlCol="0" anchor="ctr"/>
-          <a:lstStyle/>
-          <a:p>
-            <a:pPr algn="ctr"/>
-            <a:r>
-              <a:rPr lang="en-US" sz="800" dirty="0">
-                <a:solidFill>
-                  <a:schemeClr val="tx1">
-                    <a:lumMod val="65000"/>
-                    <a:lumOff val="35000"/>
-                  </a:schemeClr>
-                </a:solidFill>
-                <a:latin typeface="Arial" charset="0"/>
-                <a:cs typeface="Arial" charset="0"/>
-              </a:rPr>
-              <a:t>Mentor coordinator</a:t>
-            </a:r>
-          </a:p>
-          <a:p>
-            <a:pPr algn="ctr"/>
-            <a:r>
-              <a:rPr lang="en-US" sz="800" dirty="0">
-                <a:solidFill>
-                  <a:schemeClr val="tx1">
-                    <a:lumMod val="65000"/>
-                    <a:lumOff val="35000"/>
-                  </a:schemeClr>
-                </a:solidFill>
-                <a:latin typeface="Arial" charset="0"/>
-                <a:cs typeface="Arial" charset="0"/>
-              </a:rPr>
-              <a:t>(City Scooter)</a:t>
-            </a:r>
-          </a:p>
-        </p:txBody>
-      </p:sp>
-      <p:pic>
-        <p:nvPicPr>
-          <p:cNvPr id="14" name="Bild 5">
-            <a:extLst>
-              <a:ext uri="{FF2B5EF4-FFF2-40B4-BE49-F238E27FC236}">
-                <a16:creationId xmlns:a16="http://schemas.microsoft.com/office/drawing/2014/main" id="{3A534551-F2F6-E845-8164-1AE9C2D5CC2E}"/>
-              </a:ext>
-            </a:extLst>
-          </p:cNvPr>
-          <p:cNvPicPr>
-            <a:picLocks noChangeAspect="1"/>
-          </p:cNvPicPr>
-          <p:nvPr/>
-        </p:nvPicPr>
-        <p:blipFill rotWithShape="1">
-          <a:blip r:embed="rId2">
-            <a:extLst>
-              <a:ext uri="{28A0092B-C50C-407E-A947-70E740481C1C}">
-                <a14:useLocalDpi xmlns:a14="http://schemas.microsoft.com/office/drawing/2010/main" val="0"/>
-              </a:ext>
-            </a:extLst>
-          </a:blip>
-          <a:srcRect t="-1" b="-14943"/>
-          <a:stretch/>
-        </p:blipFill>
-        <p:spPr>
-          <a:xfrm>
-            <a:off x="534901" y="3258924"/>
-            <a:ext cx="313201" cy="360000"/>
-          </a:xfrm>
-          <a:prstGeom prst="rect">
-            <a:avLst/>
-          </a:prstGeom>
-        </p:spPr>
-      </p:pic>
-      <p:sp>
-        <p:nvSpPr>
-          <p:cNvPr id="16" name="Rechteck 9">
-            <a:extLst>
-              <a:ext uri="{FF2B5EF4-FFF2-40B4-BE49-F238E27FC236}">
-                <a16:creationId xmlns:a16="http://schemas.microsoft.com/office/drawing/2014/main" id="{906424B4-C884-7D48-B433-A5712F6CC29D}"/>
-              </a:ext>
-            </a:extLst>
-          </p:cNvPr>
-          <p:cNvSpPr/>
-          <p:nvPr/>
-        </p:nvSpPr>
-        <p:spPr>
-          <a:xfrm>
-            <a:off x="6362147" y="1124649"/>
-            <a:ext cx="83710" cy="2190573"/>
-          </a:xfrm>
-          <a:prstGeom prst="rect">
-            <a:avLst/>
-          </a:prstGeom>
-          <a:solidFill>
-            <a:schemeClr val="accent5">
-              <a:lumMod val="20000"/>
-              <a:lumOff val="80000"/>
-            </a:schemeClr>
-          </a:solidFill>
-          <a:ln w="19050" cap="rnd">
-            <a:noFill/>
-          </a:ln>
-        </p:spPr>
-        <p:style>
-          <a:lnRef idx="2">
-            <a:schemeClr val="accent1">
-              <a:shade val="50000"/>
-            </a:schemeClr>
-          </a:lnRef>
-          <a:fillRef idx="1">
-            <a:schemeClr val="accent1"/>
-          </a:fillRef>
-          <a:effectRef idx="0">
-            <a:schemeClr val="accent1"/>
-          </a:effectRef>
-          <a:fontRef idx="minor">
-            <a:schemeClr val="lt1"/>
-          </a:fontRef>
-        </p:style>
-        <p:txBody>
-          <a:bodyPr lIns="71981" tIns="71981" rIns="71981" bIns="71981" rtlCol="0" anchor="t"/>
-          <a:lstStyle/>
-          <a:p>
-            <a:endParaRPr lang="en-US" sz="1200" b="1" dirty="0">
-              <a:solidFill>
-                <a:srgbClr val="0092D1"/>
-              </a:solidFill>
-            </a:endParaRPr>
-          </a:p>
-        </p:txBody>
-      </p:sp>
-      <p:sp>
-        <p:nvSpPr>
-          <p:cNvPr id="17" name="Rechteck 9">
-            <a:extLst>
-              <a:ext uri="{FF2B5EF4-FFF2-40B4-BE49-F238E27FC236}">
-                <a16:creationId xmlns:a16="http://schemas.microsoft.com/office/drawing/2014/main" id="{F0AFB558-A023-F940-BC71-6B3E4EABB89A}"/>
-              </a:ext>
-            </a:extLst>
-          </p:cNvPr>
-          <p:cNvSpPr/>
-          <p:nvPr/>
-        </p:nvSpPr>
-        <p:spPr>
-          <a:xfrm>
-            <a:off x="6349447" y="1277049"/>
-            <a:ext cx="83710" cy="2190573"/>
-          </a:xfrm>
-          <a:prstGeom prst="rect">
-            <a:avLst/>
-          </a:prstGeom>
-          <a:solidFill>
-            <a:schemeClr val="accent5">
-              <a:lumMod val="20000"/>
-              <a:lumOff val="80000"/>
-            </a:schemeClr>
-          </a:solidFill>
-          <a:ln w="19050" cap="rnd">
-            <a:noFill/>
-          </a:ln>
-        </p:spPr>
-        <p:style>
-          <a:lnRef idx="2">
-            <a:schemeClr val="accent1">
-              <a:shade val="50000"/>
-            </a:schemeClr>
-          </a:lnRef>
-          <a:fillRef idx="1">
-            <a:schemeClr val="accent1"/>
-          </a:fillRef>
-          <a:effectRef idx="0">
-            <a:schemeClr val="accent1"/>
-          </a:effectRef>
-          <a:fontRef idx="minor">
-            <a:schemeClr val="lt1"/>
-          </a:fontRef>
-        </p:style>
-        <p:txBody>
-          <a:bodyPr lIns="71981" tIns="71981" rIns="71981" bIns="71981" rtlCol="0" anchor="t"/>
-          <a:lstStyle/>
-          <a:p>
-            <a:endParaRPr lang="en-US" sz="1200" b="1" dirty="0">
-              <a:solidFill>
-                <a:srgbClr val="0092D1"/>
-              </a:solidFill>
-            </a:endParaRPr>
-          </a:p>
-        </p:txBody>
-      </p:sp>
-      <p:sp>
-        <p:nvSpPr>
-          <p:cNvPr id="18" name="Rechteck 9">
-            <a:extLst>
-              <a:ext uri="{FF2B5EF4-FFF2-40B4-BE49-F238E27FC236}">
-                <a16:creationId xmlns:a16="http://schemas.microsoft.com/office/drawing/2014/main" id="{C6595030-9149-DC41-AB82-7B6F55A98BD7}"/>
-              </a:ext>
-            </a:extLst>
-          </p:cNvPr>
-          <p:cNvSpPr/>
-          <p:nvPr/>
-        </p:nvSpPr>
-        <p:spPr>
-          <a:xfrm>
-            <a:off x="6608265" y="3949149"/>
-            <a:ext cx="2774274" cy="1828799"/>
-          </a:xfrm>
-          <a:prstGeom prst="rect">
-            <a:avLst/>
-          </a:prstGeom>
-          <a:solidFill>
-            <a:schemeClr val="accent5">
-              <a:lumMod val="20000"/>
-              <a:lumOff val="80000"/>
-            </a:schemeClr>
-          </a:solidFill>
-          <a:ln w="19050" cap="rnd">
-            <a:solidFill>
-              <a:srgbClr val="0092D1"/>
-            </a:solidFill>
-          </a:ln>
-        </p:spPr>
-        <p:style>
-          <a:lnRef idx="2">
-            <a:schemeClr val="accent1">
-              <a:shade val="50000"/>
-            </a:schemeClr>
-          </a:lnRef>
-          <a:fillRef idx="1">
-            <a:schemeClr val="accent1"/>
-          </a:fillRef>
-          <a:effectRef idx="0">
-            <a:schemeClr val="accent1"/>
-          </a:effectRef>
-          <a:fontRef idx="minor">
-            <a:schemeClr val="lt1"/>
-          </a:fontRef>
-        </p:style>
-        <p:txBody>
-          <a:bodyPr lIns="71981" tIns="71981" rIns="71981" bIns="71981" rtlCol="0" anchor="t"/>
-          <a:lstStyle/>
-          <a:p>
-            <a:r>
-              <a:rPr lang="en-US" sz="1000" b="1" dirty="0">
-                <a:solidFill>
-                  <a:schemeClr val="accent5"/>
-                </a:solidFill>
-              </a:rPr>
-              <a:t>Consumer Subaccounts</a:t>
-            </a:r>
-          </a:p>
-        </p:txBody>
-      </p:sp>
-      <p:sp>
-        <p:nvSpPr>
-          <p:cNvPr id="21" name="Rectangle 20">
-            <a:extLst>
-              <a:ext uri="{FF2B5EF4-FFF2-40B4-BE49-F238E27FC236}">
-                <a16:creationId xmlns:a16="http://schemas.microsoft.com/office/drawing/2014/main" id="{65CC5A98-B99E-A246-8201-09841D559A53}"/>
-              </a:ext>
-            </a:extLst>
-          </p:cNvPr>
-          <p:cNvSpPr/>
-          <p:nvPr/>
-        </p:nvSpPr>
-        <p:spPr>
-          <a:xfrm>
-            <a:off x="1766729" y="1498784"/>
-            <a:ext cx="4475046" cy="4431564"/>
-          </a:xfrm>
-          <a:prstGeom prst="rect">
-            <a:avLst/>
-          </a:prstGeom>
-          <a:noFill/>
-          <a:ln>
-            <a:solidFill>
-              <a:schemeClr val="tx2"/>
-            </a:solidFill>
-          </a:ln>
-        </p:spPr>
-        <p:style>
-          <a:lnRef idx="2">
-            <a:schemeClr val="accent1">
-              <a:shade val="50000"/>
-            </a:schemeClr>
-          </a:lnRef>
-          <a:fillRef idx="1">
-            <a:schemeClr val="accent1"/>
-          </a:fillRef>
-          <a:effectRef idx="0">
-            <a:schemeClr val="accent1"/>
-          </a:effectRef>
-          <a:fontRef idx="minor">
-            <a:schemeClr val="lt1"/>
-          </a:fontRef>
-        </p:style>
-        <p:txBody>
-          <a:bodyPr rtlCol="0" anchor="ctr"/>
-          <a:lstStyle/>
-          <a:p>
-            <a:pPr algn="ctr"/>
-            <a:endParaRPr lang="en-DE" dirty="0"/>
-          </a:p>
-        </p:txBody>
-      </p:sp>
-      <p:pic>
-        <p:nvPicPr>
-          <p:cNvPr id="1026" name="Picture 2" descr="GitHub - kyma-project/kyma: A flexible and easy way to connect and extend  enterprise applications in a cloud-native world">
-            <a:extLst>
-              <a:ext uri="{FF2B5EF4-FFF2-40B4-BE49-F238E27FC236}">
-                <a16:creationId xmlns:a16="http://schemas.microsoft.com/office/drawing/2014/main" id="{83A04BB7-1236-2C47-A716-AFCCC36A7ED9}"/>
-              </a:ext>
-            </a:extLst>
-          </p:cNvPr>
-          <p:cNvPicPr>
-            <a:picLocks noChangeAspect="1" noChangeArrowheads="1"/>
-          </p:cNvPicPr>
-          <p:nvPr/>
-        </p:nvPicPr>
-        <p:blipFill>
-          <a:blip r:embed="rId3">
-            <a:extLst>
-              <a:ext uri="{28A0092B-C50C-407E-A947-70E740481C1C}">
-                <a14:useLocalDpi xmlns:a14="http://schemas.microsoft.com/office/drawing/2010/main" val="0"/>
-              </a:ext>
-            </a:extLst>
-          </a:blip>
-          <a:srcRect/>
-          <a:stretch>
-            <a:fillRect/>
-          </a:stretch>
-        </p:blipFill>
-        <p:spPr bwMode="auto">
-          <a:xfrm>
-            <a:off x="1890893" y="1602012"/>
-            <a:ext cx="613768" cy="216257"/>
-          </a:xfrm>
-          <a:prstGeom prst="rect">
-            <a:avLst/>
-          </a:prstGeom>
-          <a:noFill/>
-          <a:extLst>
-            <a:ext uri="{909E8E84-426E-40DD-AFC4-6F175D3DCCD1}">
-              <a14:hiddenFill xmlns:a14="http://schemas.microsoft.com/office/drawing/2010/main">
-                <a:solidFill>
-                  <a:srgbClr val="FFFFFF"/>
-                </a:solidFill>
-              </a14:hiddenFill>
-            </a:ext>
-          </a:extLst>
-        </p:spPr>
-      </p:pic>
-      <p:sp>
-        <p:nvSpPr>
-          <p:cNvPr id="23" name="Rectangle 22">
-            <a:extLst>
-              <a:ext uri="{FF2B5EF4-FFF2-40B4-BE49-F238E27FC236}">
-                <a16:creationId xmlns:a16="http://schemas.microsoft.com/office/drawing/2014/main" id="{D8C16350-31BF-0140-BFA1-0B628BE410C7}"/>
-              </a:ext>
-            </a:extLst>
-          </p:cNvPr>
-          <p:cNvSpPr/>
-          <p:nvPr/>
-        </p:nvSpPr>
-        <p:spPr>
-          <a:xfrm>
-            <a:off x="6387547" y="1498783"/>
-            <a:ext cx="3147392" cy="1826515"/>
-          </a:xfrm>
-          <a:prstGeom prst="rect">
-            <a:avLst/>
-          </a:prstGeom>
-          <a:noFill/>
-          <a:ln>
-            <a:solidFill>
-              <a:schemeClr val="tx2"/>
-            </a:solidFill>
-          </a:ln>
-        </p:spPr>
-        <p:style>
-          <a:lnRef idx="2">
-            <a:schemeClr val="accent1">
-              <a:shade val="50000"/>
-            </a:schemeClr>
-          </a:lnRef>
-          <a:fillRef idx="1">
-            <a:schemeClr val="accent1"/>
-          </a:fillRef>
-          <a:effectRef idx="0">
-            <a:schemeClr val="accent1"/>
-          </a:effectRef>
-          <a:fontRef idx="minor">
-            <a:schemeClr val="lt1"/>
-          </a:fontRef>
-        </p:style>
-        <p:txBody>
-          <a:bodyPr rtlCol="0" anchor="ctr"/>
-          <a:lstStyle/>
-          <a:p>
-            <a:pPr algn="ctr"/>
-            <a:endParaRPr lang="en-DE" dirty="0"/>
-          </a:p>
-        </p:txBody>
-      </p:sp>
-      <p:pic>
-        <p:nvPicPr>
-          <p:cNvPr id="1028" name="Picture 4" descr="Cloud Foundry – Open Source Cloud Native Application Delivery">
-            <a:extLst>
-              <a:ext uri="{FF2B5EF4-FFF2-40B4-BE49-F238E27FC236}">
-                <a16:creationId xmlns:a16="http://schemas.microsoft.com/office/drawing/2014/main" id="{CBEBA09B-CC6D-5448-9FCE-CEB7170E6C16}"/>
-              </a:ext>
-            </a:extLst>
-          </p:cNvPr>
-          <p:cNvPicPr>
-            <a:picLocks noChangeAspect="1" noChangeArrowheads="1"/>
-          </p:cNvPicPr>
-          <p:nvPr/>
-        </p:nvPicPr>
-        <p:blipFill>
-          <a:blip r:embed="rId4">
-            <a:extLst>
-              <a:ext uri="{28A0092B-C50C-407E-A947-70E740481C1C}">
-                <a14:useLocalDpi xmlns:a14="http://schemas.microsoft.com/office/drawing/2010/main" val="0"/>
-              </a:ext>
-            </a:extLst>
-          </a:blip>
-          <a:srcRect/>
-          <a:stretch>
-            <a:fillRect/>
-          </a:stretch>
-        </p:blipFill>
-        <p:spPr bwMode="auto">
-          <a:xfrm>
-            <a:off x="6482349" y="1602012"/>
-            <a:ext cx="1063096" cy="145345"/>
-          </a:xfrm>
-          <a:prstGeom prst="rect">
-            <a:avLst/>
-          </a:prstGeom>
-          <a:noFill/>
-          <a:extLst>
-            <a:ext uri="{909E8E84-426E-40DD-AFC4-6F175D3DCCD1}">
-              <a14:hiddenFill xmlns:a14="http://schemas.microsoft.com/office/drawing/2010/main">
-                <a:solidFill>
-                  <a:srgbClr val="FFFFFF"/>
-                </a:solidFill>
-              </a14:hiddenFill>
-            </a:ext>
-          </a:extLst>
-        </p:spPr>
-      </p:pic>
-      <p:sp>
-        <p:nvSpPr>
-          <p:cNvPr id="29" name="Rectangle 28">
-            <a:extLst>
-              <a:ext uri="{FF2B5EF4-FFF2-40B4-BE49-F238E27FC236}">
-                <a16:creationId xmlns:a16="http://schemas.microsoft.com/office/drawing/2014/main" id="{44F578B9-2043-AC4B-8C4A-A980C2720241}"/>
-              </a:ext>
-            </a:extLst>
-          </p:cNvPr>
-          <p:cNvSpPr/>
-          <p:nvPr/>
-        </p:nvSpPr>
-        <p:spPr>
-          <a:xfrm>
-            <a:off x="2308271" y="1981888"/>
-            <a:ext cx="3342687" cy="1956158"/>
-          </a:xfrm>
-          <a:prstGeom prst="rect">
-            <a:avLst/>
-          </a:prstGeom>
-          <a:noFill/>
-          <a:ln w="15875">
-            <a:solidFill>
-              <a:schemeClr val="tx1">
-                <a:lumMod val="50000"/>
-                <a:lumOff val="50000"/>
-              </a:schemeClr>
-            </a:solidFill>
-            <a:prstDash val="sysDot"/>
-          </a:ln>
-        </p:spPr>
-        <p:style>
-          <a:lnRef idx="2">
-            <a:schemeClr val="accent1">
-              <a:shade val="50000"/>
-            </a:schemeClr>
-          </a:lnRef>
-          <a:fillRef idx="1">
-            <a:schemeClr val="accent1"/>
-          </a:fillRef>
-          <a:effectRef idx="0">
-            <a:schemeClr val="accent1"/>
-          </a:effectRef>
-          <a:fontRef idx="minor">
-            <a:schemeClr val="lt1"/>
-          </a:fontRef>
-        </p:style>
-        <p:txBody>
-          <a:bodyPr rtlCol="0" anchor="ctr"/>
-          <a:lstStyle/>
-          <a:p>
-            <a:pPr algn="ctr"/>
-            <a:endParaRPr lang="en-DE" sz="1000" dirty="0">
-              <a:solidFill>
-                <a:schemeClr val="tx1"/>
-              </a:solidFill>
-            </a:endParaRPr>
-          </a:p>
-        </p:txBody>
-      </p:sp>
-      <p:sp>
-        <p:nvSpPr>
-          <p:cNvPr id="37" name="Rechteck 61">
-            <a:extLst>
-              <a:ext uri="{FF2B5EF4-FFF2-40B4-BE49-F238E27FC236}">
-                <a16:creationId xmlns:a16="http://schemas.microsoft.com/office/drawing/2014/main" id="{4BD469F0-03AC-0A45-B660-99B25790F577}"/>
-              </a:ext>
-            </a:extLst>
-          </p:cNvPr>
-          <p:cNvSpPr/>
-          <p:nvPr/>
-        </p:nvSpPr>
-        <p:spPr>
-          <a:xfrm>
-            <a:off x="2594592" y="2476287"/>
-            <a:ext cx="1041317" cy="456045"/>
-          </a:xfrm>
-          <a:prstGeom prst="rect">
-            <a:avLst/>
-          </a:prstGeom>
-          <a:solidFill>
-            <a:schemeClr val="bg1"/>
-          </a:solidFill>
-          <a:ln w="12700">
-            <a:solidFill>
-              <a:srgbClr val="1A9898"/>
-            </a:solidFill>
-          </a:ln>
-          <a:effectLst/>
-        </p:spPr>
-        <p:style>
-          <a:lnRef idx="2">
-            <a:schemeClr val="accent1">
-              <a:shade val="50000"/>
-            </a:schemeClr>
-          </a:lnRef>
-          <a:fillRef idx="1">
-            <a:schemeClr val="accent1"/>
-          </a:fillRef>
-          <a:effectRef idx="0">
-            <a:schemeClr val="accent1"/>
-          </a:effectRef>
-          <a:fontRef idx="minor">
-            <a:schemeClr val="lt1"/>
-          </a:fontRef>
-        </p:style>
-        <p:txBody>
-          <a:bodyPr lIns="72000" tIns="72000" rIns="72000" bIns="72000" rtlCol="0" anchor="ctr" anchorCtr="0"/>
-          <a:lstStyle/>
-          <a:p>
-            <a:pPr algn="ctr"/>
-            <a:r>
-              <a:rPr lang="en-US" sz="800" kern="0" dirty="0" err="1">
-                <a:solidFill>
-                  <a:schemeClr val="tx1"/>
-                </a:solidFill>
-                <a:latin typeface="Arial" panose="020B0604020202020204" pitchFamily="34" charset="0"/>
-                <a:ea typeface="BentonSans Bold" charset="0"/>
-                <a:cs typeface="Arial" panose="020B0604020202020204" pitchFamily="34" charset="0"/>
-              </a:rPr>
-              <a:t>AppRouter</a:t>
-            </a:r>
-            <a:endParaRPr lang="en-US" sz="800" kern="0" dirty="0">
-              <a:solidFill>
-                <a:schemeClr val="tx1"/>
-              </a:solidFill>
-              <a:latin typeface="Arial" panose="020B0604020202020204" pitchFamily="34" charset="0"/>
-              <a:ea typeface="BentonSans Bold" charset="0"/>
-              <a:cs typeface="Arial" panose="020B0604020202020204" pitchFamily="34" charset="0"/>
-            </a:endParaRPr>
-          </a:p>
-        </p:txBody>
-      </p:sp>
-      <p:sp>
-        <p:nvSpPr>
-          <p:cNvPr id="43" name="Rechteck 61">
-            <a:extLst>
-              <a:ext uri="{FF2B5EF4-FFF2-40B4-BE49-F238E27FC236}">
-                <a16:creationId xmlns:a16="http://schemas.microsoft.com/office/drawing/2014/main" id="{61F5C82C-44E7-B049-999A-967401ACCADA}"/>
-              </a:ext>
-            </a:extLst>
-          </p:cNvPr>
-          <p:cNvSpPr/>
-          <p:nvPr/>
-        </p:nvSpPr>
-        <p:spPr>
-          <a:xfrm>
-            <a:off x="6753259" y="4297654"/>
-            <a:ext cx="2476260" cy="456045"/>
-          </a:xfrm>
-          <a:prstGeom prst="rect">
-            <a:avLst/>
-          </a:prstGeom>
-          <a:solidFill>
-            <a:schemeClr val="bg1"/>
-          </a:solidFill>
-          <a:ln w="12700">
-            <a:solidFill>
-              <a:srgbClr val="1A9898"/>
-            </a:solidFill>
-          </a:ln>
-          <a:effectLst/>
-        </p:spPr>
-        <p:style>
-          <a:lnRef idx="2">
-            <a:schemeClr val="accent1">
-              <a:shade val="50000"/>
-            </a:schemeClr>
-          </a:lnRef>
-          <a:fillRef idx="1">
-            <a:schemeClr val="accent1"/>
-          </a:fillRef>
-          <a:effectRef idx="0">
-            <a:schemeClr val="accent1"/>
-          </a:effectRef>
-          <a:fontRef idx="minor">
-            <a:schemeClr val="lt1"/>
-          </a:fontRef>
-        </p:style>
-        <p:txBody>
-          <a:bodyPr lIns="72000" tIns="72000" rIns="72000" bIns="72000" rtlCol="0" anchor="ctr" anchorCtr="0"/>
-          <a:lstStyle/>
-          <a:p>
-            <a:pPr algn="ctr"/>
-            <a:r>
-              <a:rPr lang="en-US" sz="800" kern="0" dirty="0">
-                <a:solidFill>
-                  <a:schemeClr val="tx1"/>
-                </a:solidFill>
-                <a:latin typeface="Arial" panose="020B0604020202020204" pitchFamily="34" charset="0"/>
-                <a:ea typeface="BentonSans Bold" charset="0"/>
-                <a:cs typeface="Arial" panose="020B0604020202020204" pitchFamily="34" charset="0"/>
-              </a:rPr>
-              <a:t>Destination configuration</a:t>
-            </a:r>
-          </a:p>
-        </p:txBody>
-      </p:sp>
-      <p:sp>
-        <p:nvSpPr>
-          <p:cNvPr id="44" name="Rechteck 61">
-            <a:extLst>
-              <a:ext uri="{FF2B5EF4-FFF2-40B4-BE49-F238E27FC236}">
-                <a16:creationId xmlns:a16="http://schemas.microsoft.com/office/drawing/2014/main" id="{29FCC4AB-8D68-924D-821C-BEFD09ABE7EF}"/>
-              </a:ext>
-            </a:extLst>
-          </p:cNvPr>
-          <p:cNvSpPr/>
-          <p:nvPr/>
-        </p:nvSpPr>
-        <p:spPr>
-          <a:xfrm>
-            <a:off x="6767293" y="4992184"/>
-            <a:ext cx="2476260" cy="456045"/>
-          </a:xfrm>
-          <a:prstGeom prst="rect">
-            <a:avLst/>
-          </a:prstGeom>
-          <a:solidFill>
-            <a:schemeClr val="bg1"/>
-          </a:solidFill>
-          <a:ln w="12700">
-            <a:solidFill>
-              <a:srgbClr val="1A9898"/>
-            </a:solidFill>
-          </a:ln>
-          <a:effectLst/>
-        </p:spPr>
-        <p:style>
-          <a:lnRef idx="2">
-            <a:schemeClr val="accent1">
-              <a:shade val="50000"/>
-            </a:schemeClr>
-          </a:lnRef>
-          <a:fillRef idx="1">
-            <a:schemeClr val="accent1"/>
-          </a:fillRef>
-          <a:effectRef idx="0">
-            <a:schemeClr val="accent1"/>
-          </a:effectRef>
-          <a:fontRef idx="minor">
-            <a:schemeClr val="lt1"/>
-          </a:fontRef>
-        </p:style>
-        <p:txBody>
-          <a:bodyPr lIns="72000" tIns="72000" rIns="72000" bIns="72000" rtlCol="0" anchor="ctr" anchorCtr="0"/>
-          <a:lstStyle/>
-          <a:p>
-            <a:pPr algn="ctr"/>
-            <a:r>
-              <a:rPr lang="en-US" sz="800" kern="0" dirty="0">
-                <a:solidFill>
-                  <a:schemeClr val="tx1"/>
-                </a:solidFill>
-                <a:latin typeface="Arial" panose="020B0604020202020204" pitchFamily="34" charset="0"/>
-                <a:ea typeface="BentonSans Bold" charset="0"/>
-                <a:cs typeface="Arial" panose="020B0604020202020204" pitchFamily="34" charset="0"/>
-              </a:rPr>
-              <a:t>End User </a:t>
-            </a:r>
-            <a:r>
-              <a:rPr lang="en-US" sz="800" kern="0" dirty="0" err="1">
-                <a:solidFill>
-                  <a:schemeClr val="tx1"/>
-                </a:solidFill>
-                <a:latin typeface="Arial" panose="020B0604020202020204" pitchFamily="34" charset="0"/>
-                <a:ea typeface="BentonSans Bold" charset="0"/>
-                <a:cs typeface="Arial" panose="020B0604020202020204" pitchFamily="34" charset="0"/>
-              </a:rPr>
-              <a:t>Assignement</a:t>
-            </a:r>
-            <a:endParaRPr lang="en-US" sz="800" kern="0" dirty="0">
-              <a:solidFill>
-                <a:schemeClr val="tx1"/>
-              </a:solidFill>
-              <a:latin typeface="Arial" panose="020B0604020202020204" pitchFamily="34" charset="0"/>
-              <a:ea typeface="BentonSans Bold" charset="0"/>
-              <a:cs typeface="Arial" panose="020B0604020202020204" pitchFamily="34" charset="0"/>
-            </a:endParaRPr>
-          </a:p>
-        </p:txBody>
-      </p:sp>
-      <p:sp>
-        <p:nvSpPr>
-          <p:cNvPr id="54" name="Rectangle 53">
-            <a:extLst>
-              <a:ext uri="{FF2B5EF4-FFF2-40B4-BE49-F238E27FC236}">
-                <a16:creationId xmlns:a16="http://schemas.microsoft.com/office/drawing/2014/main" id="{5DB38D41-92F6-164C-9D07-B0206166646F}"/>
-              </a:ext>
-            </a:extLst>
-          </p:cNvPr>
-          <p:cNvSpPr/>
-          <p:nvPr/>
-        </p:nvSpPr>
-        <p:spPr>
-          <a:xfrm>
-            <a:off x="6531507" y="1895187"/>
-            <a:ext cx="2851032" cy="1271544"/>
-          </a:xfrm>
-          <a:prstGeom prst="rect">
-            <a:avLst/>
-          </a:prstGeom>
-          <a:solidFill>
-            <a:schemeClr val="bg1"/>
-          </a:solidFill>
-          <a:ln w="15875">
-            <a:solidFill>
-              <a:schemeClr val="tx1">
-                <a:lumMod val="50000"/>
-                <a:lumOff val="50000"/>
-              </a:schemeClr>
-            </a:solidFill>
-            <a:prstDash val="sysDot"/>
-          </a:ln>
-        </p:spPr>
-        <p:style>
-          <a:lnRef idx="2">
-            <a:schemeClr val="accent1">
-              <a:shade val="50000"/>
-            </a:schemeClr>
-          </a:lnRef>
-          <a:fillRef idx="1">
-            <a:schemeClr val="accent1"/>
-          </a:fillRef>
-          <a:effectRef idx="0">
-            <a:schemeClr val="accent1"/>
-          </a:effectRef>
-          <a:fontRef idx="minor">
-            <a:schemeClr val="lt1"/>
-          </a:fontRef>
-        </p:style>
-        <p:txBody>
-          <a:bodyPr rtlCol="0" anchor="ctr"/>
-          <a:lstStyle/>
-          <a:p>
-            <a:pPr algn="ctr"/>
-            <a:endParaRPr lang="en-DE" sz="1000" dirty="0">
-              <a:solidFill>
-                <a:schemeClr val="tx1"/>
-              </a:solidFill>
-            </a:endParaRPr>
-          </a:p>
-        </p:txBody>
-      </p:sp>
-      <p:sp>
-        <p:nvSpPr>
-          <p:cNvPr id="55" name="TextBox 54">
-            <a:extLst>
-              <a:ext uri="{FF2B5EF4-FFF2-40B4-BE49-F238E27FC236}">
-                <a16:creationId xmlns:a16="http://schemas.microsoft.com/office/drawing/2014/main" id="{DE8D58DE-86FB-AC46-801A-7F7CFC8394CA}"/>
-              </a:ext>
-            </a:extLst>
-          </p:cNvPr>
-          <p:cNvSpPr txBox="1"/>
-          <p:nvPr/>
-        </p:nvSpPr>
-        <p:spPr>
-          <a:xfrm>
-            <a:off x="6557325" y="1943462"/>
-            <a:ext cx="894797" cy="215444"/>
-          </a:xfrm>
-          <a:prstGeom prst="rect">
-            <a:avLst/>
-          </a:prstGeom>
-          <a:noFill/>
-        </p:spPr>
-        <p:txBody>
-          <a:bodyPr wrap="none" rtlCol="0">
-            <a:spAutoFit/>
-          </a:bodyPr>
-          <a:lstStyle/>
-          <a:p>
-            <a:r>
-              <a:rPr lang="en-DE" sz="800" b="1" dirty="0">
-                <a:solidFill>
-                  <a:schemeClr val="tx1">
-                    <a:lumMod val="50000"/>
-                    <a:lumOff val="50000"/>
-                  </a:schemeClr>
-                </a:solidFill>
-              </a:rPr>
-              <a:t>SAP HANA Cloud</a:t>
-            </a:r>
-          </a:p>
-        </p:txBody>
-      </p:sp>
-      <p:pic>
-        <p:nvPicPr>
-          <p:cNvPr id="1044" name="Picture 20" descr="Datenbank - Kostenlose technologie Icons">
-            <a:extLst>
-              <a:ext uri="{FF2B5EF4-FFF2-40B4-BE49-F238E27FC236}">
-                <a16:creationId xmlns:a16="http://schemas.microsoft.com/office/drawing/2014/main" id="{02E14EAC-C5B6-DE4B-8F0C-B776A25B480B}"/>
-              </a:ext>
-            </a:extLst>
-          </p:cNvPr>
-          <p:cNvPicPr>
-            <a:picLocks noChangeAspect="1" noChangeArrowheads="1"/>
-          </p:cNvPicPr>
-          <p:nvPr/>
-        </p:nvPicPr>
-        <p:blipFill>
-          <a:blip r:embed="rId5">
-            <a:duotone>
-              <a:prstClr val="black"/>
-              <a:schemeClr val="accent3">
-                <a:tint val="45000"/>
-                <a:satMod val="400000"/>
-              </a:schemeClr>
-            </a:duotone>
-            <a:extLst>
-              <a:ext uri="{28A0092B-C50C-407E-A947-70E740481C1C}">
-                <a14:useLocalDpi xmlns:a14="http://schemas.microsoft.com/office/drawing/2010/main" val="0"/>
-              </a:ext>
-            </a:extLst>
-          </a:blip>
-          <a:srcRect/>
-          <a:stretch>
-            <a:fillRect/>
-          </a:stretch>
-        </p:blipFill>
-        <p:spPr bwMode="auto">
-          <a:xfrm>
-            <a:off x="7051477" y="2392178"/>
-            <a:ext cx="301876" cy="301876"/>
-          </a:xfrm>
-          <a:prstGeom prst="rect">
-            <a:avLst/>
-          </a:prstGeom>
-          <a:noFill/>
-          <a:extLst>
-            <a:ext uri="{909E8E84-426E-40DD-AFC4-6F175D3DCCD1}">
-              <a14:hiddenFill xmlns:a14="http://schemas.microsoft.com/office/drawing/2010/main">
-                <a:solidFill>
-                  <a:srgbClr val="FFFFFF"/>
-                </a:solidFill>
-              </a14:hiddenFill>
-            </a:ext>
-          </a:extLst>
-        </p:spPr>
-      </p:pic>
-      <p:pic>
-        <p:nvPicPr>
-          <p:cNvPr id="57" name="Picture 20" descr="Datenbank - Kostenlose technologie Icons">
-            <a:extLst>
-              <a:ext uri="{FF2B5EF4-FFF2-40B4-BE49-F238E27FC236}">
-                <a16:creationId xmlns:a16="http://schemas.microsoft.com/office/drawing/2014/main" id="{9EF612DB-4FCC-D74B-851F-381ADF50111B}"/>
-              </a:ext>
-            </a:extLst>
-          </p:cNvPr>
-          <p:cNvPicPr>
-            <a:picLocks noChangeAspect="1" noChangeArrowheads="1"/>
-          </p:cNvPicPr>
-          <p:nvPr/>
-        </p:nvPicPr>
-        <p:blipFill>
-          <a:blip r:embed="rId5">
-            <a:duotone>
-              <a:prstClr val="black"/>
-              <a:schemeClr val="accent3">
-                <a:tint val="45000"/>
-                <a:satMod val="400000"/>
-              </a:schemeClr>
-            </a:duotone>
-            <a:extLst>
-              <a:ext uri="{28A0092B-C50C-407E-A947-70E740481C1C}">
-                <a14:useLocalDpi xmlns:a14="http://schemas.microsoft.com/office/drawing/2010/main" val="0"/>
-              </a:ext>
-            </a:extLst>
-          </a:blip>
-          <a:srcRect/>
-          <a:stretch>
-            <a:fillRect/>
-          </a:stretch>
-        </p:blipFill>
-        <p:spPr bwMode="auto">
-          <a:xfrm>
-            <a:off x="8009390" y="2389489"/>
-            <a:ext cx="301876" cy="301876"/>
-          </a:xfrm>
-          <a:prstGeom prst="rect">
-            <a:avLst/>
-          </a:prstGeom>
-          <a:noFill/>
-          <a:extLst>
-            <a:ext uri="{909E8E84-426E-40DD-AFC4-6F175D3DCCD1}">
-              <a14:hiddenFill xmlns:a14="http://schemas.microsoft.com/office/drawing/2010/main">
-                <a:solidFill>
-                  <a:srgbClr val="FFFFFF"/>
-                </a:solidFill>
-              </a14:hiddenFill>
-            </a:ext>
-          </a:extLst>
-        </p:spPr>
-      </p:pic>
-      <p:pic>
-        <p:nvPicPr>
-          <p:cNvPr id="58" name="Picture 20" descr="Datenbank - Kostenlose technologie Icons">
-            <a:extLst>
-              <a:ext uri="{FF2B5EF4-FFF2-40B4-BE49-F238E27FC236}">
-                <a16:creationId xmlns:a16="http://schemas.microsoft.com/office/drawing/2014/main" id="{43BE0961-4AF8-884E-83F1-DEB1324CC64C}"/>
-              </a:ext>
-            </a:extLst>
-          </p:cNvPr>
-          <p:cNvPicPr>
-            <a:picLocks noChangeAspect="1" noChangeArrowheads="1"/>
-          </p:cNvPicPr>
-          <p:nvPr/>
-        </p:nvPicPr>
-        <p:blipFill>
-          <a:blip r:embed="rId5">
-            <a:duotone>
-              <a:prstClr val="black"/>
-              <a:schemeClr val="accent3">
-                <a:tint val="45000"/>
-                <a:satMod val="400000"/>
-              </a:schemeClr>
-            </a:duotone>
-            <a:extLst>
-              <a:ext uri="{28A0092B-C50C-407E-A947-70E740481C1C}">
-                <a14:useLocalDpi xmlns:a14="http://schemas.microsoft.com/office/drawing/2010/main" val="0"/>
-              </a:ext>
-            </a:extLst>
-          </a:blip>
-          <a:srcRect/>
-          <a:stretch>
-            <a:fillRect/>
-          </a:stretch>
-        </p:blipFill>
-        <p:spPr bwMode="auto">
-          <a:xfrm>
-            <a:off x="8399739" y="2384643"/>
-            <a:ext cx="301876" cy="301876"/>
-          </a:xfrm>
-          <a:prstGeom prst="rect">
-            <a:avLst/>
-          </a:prstGeom>
-          <a:noFill/>
-          <a:extLst>
-            <a:ext uri="{909E8E84-426E-40DD-AFC4-6F175D3DCCD1}">
-              <a14:hiddenFill xmlns:a14="http://schemas.microsoft.com/office/drawing/2010/main">
-                <a:solidFill>
-                  <a:srgbClr val="FFFFFF"/>
-                </a:solidFill>
-              </a14:hiddenFill>
-            </a:ext>
-          </a:extLst>
-        </p:spPr>
-      </p:pic>
-      <p:pic>
-        <p:nvPicPr>
-          <p:cNvPr id="59" name="Picture 20" descr="Datenbank - Kostenlose technologie Icons">
-            <a:extLst>
-              <a:ext uri="{FF2B5EF4-FFF2-40B4-BE49-F238E27FC236}">
-                <a16:creationId xmlns:a16="http://schemas.microsoft.com/office/drawing/2014/main" id="{977C8B9D-3BDB-6F47-95CB-262AC0F604FF}"/>
-              </a:ext>
-            </a:extLst>
-          </p:cNvPr>
-          <p:cNvPicPr>
-            <a:picLocks noChangeAspect="1" noChangeArrowheads="1"/>
-          </p:cNvPicPr>
-          <p:nvPr/>
-        </p:nvPicPr>
-        <p:blipFill>
-          <a:blip r:embed="rId5">
-            <a:duotone>
-              <a:prstClr val="black"/>
-              <a:schemeClr val="accent3">
-                <a:tint val="45000"/>
-                <a:satMod val="400000"/>
-              </a:schemeClr>
-            </a:duotone>
-            <a:extLst>
-              <a:ext uri="{28A0092B-C50C-407E-A947-70E740481C1C}">
-                <a14:useLocalDpi xmlns:a14="http://schemas.microsoft.com/office/drawing/2010/main" val="0"/>
-              </a:ext>
-            </a:extLst>
-          </a:blip>
-          <a:srcRect/>
-          <a:stretch>
-            <a:fillRect/>
-          </a:stretch>
-        </p:blipFill>
-        <p:spPr bwMode="auto">
-          <a:xfrm>
-            <a:off x="8789503" y="2384643"/>
-            <a:ext cx="301876" cy="301876"/>
-          </a:xfrm>
-          <a:prstGeom prst="rect">
-            <a:avLst/>
-          </a:prstGeom>
-          <a:noFill/>
-          <a:extLst>
-            <a:ext uri="{909E8E84-426E-40DD-AFC4-6F175D3DCCD1}">
-              <a14:hiddenFill xmlns:a14="http://schemas.microsoft.com/office/drawing/2010/main">
-                <a:solidFill>
-                  <a:srgbClr val="FFFFFF"/>
-                </a:solidFill>
-              </a14:hiddenFill>
-            </a:ext>
-          </a:extLst>
-        </p:spPr>
-      </p:pic>
-      <p:sp>
-        <p:nvSpPr>
-          <p:cNvPr id="26" name="TextBox 25">
-            <a:extLst>
-              <a:ext uri="{FF2B5EF4-FFF2-40B4-BE49-F238E27FC236}">
-                <a16:creationId xmlns:a16="http://schemas.microsoft.com/office/drawing/2014/main" id="{031E8F6E-B1F9-C048-8889-347562A1E461}"/>
-              </a:ext>
-            </a:extLst>
-          </p:cNvPr>
-          <p:cNvSpPr txBox="1"/>
-          <p:nvPr/>
-        </p:nvSpPr>
-        <p:spPr>
-          <a:xfrm flipH="1">
-            <a:off x="6748050" y="2711111"/>
-            <a:ext cx="881102" cy="215444"/>
-          </a:xfrm>
-          <a:prstGeom prst="rect">
-            <a:avLst/>
-          </a:prstGeom>
-          <a:noFill/>
-        </p:spPr>
-        <p:txBody>
-          <a:bodyPr wrap="square" rtlCol="0">
-            <a:spAutoFit/>
-          </a:bodyPr>
-          <a:lstStyle/>
-          <a:p>
-            <a:r>
-              <a:rPr lang="en-DE" sz="800" dirty="0">
-                <a:solidFill>
-                  <a:schemeClr val="tx1">
-                    <a:lumMod val="75000"/>
-                    <a:lumOff val="25000"/>
-                  </a:schemeClr>
-                </a:solidFill>
-              </a:rPr>
-              <a:t>Provider schema</a:t>
-            </a:r>
-          </a:p>
-        </p:txBody>
-      </p:sp>
-      <p:sp>
-        <p:nvSpPr>
-          <p:cNvPr id="61" name="TextBox 60">
-            <a:extLst>
-              <a:ext uri="{FF2B5EF4-FFF2-40B4-BE49-F238E27FC236}">
-                <a16:creationId xmlns:a16="http://schemas.microsoft.com/office/drawing/2014/main" id="{EF6DEA95-B95D-9C49-B4CD-A306911EF9AA}"/>
-              </a:ext>
-            </a:extLst>
-          </p:cNvPr>
-          <p:cNvSpPr txBox="1"/>
-          <p:nvPr/>
-        </p:nvSpPr>
-        <p:spPr>
-          <a:xfrm flipH="1">
-            <a:off x="8009390" y="2708422"/>
-            <a:ext cx="1081988" cy="215444"/>
-          </a:xfrm>
-          <a:prstGeom prst="rect">
-            <a:avLst/>
-          </a:prstGeom>
-          <a:noFill/>
-        </p:spPr>
-        <p:txBody>
-          <a:bodyPr wrap="square" rtlCol="0">
-            <a:spAutoFit/>
-          </a:bodyPr>
-          <a:lstStyle/>
-          <a:p>
-            <a:pPr algn="ctr"/>
-            <a:r>
-              <a:rPr lang="en-DE" sz="800" dirty="0">
-                <a:solidFill>
-                  <a:schemeClr val="tx1">
-                    <a:lumMod val="75000"/>
-                    <a:lumOff val="25000"/>
-                  </a:schemeClr>
-                </a:solidFill>
-              </a:rPr>
-              <a:t>Customer schemas</a:t>
-            </a:r>
-          </a:p>
-        </p:txBody>
-      </p:sp>
-      <p:cxnSp>
-        <p:nvCxnSpPr>
-          <p:cNvPr id="89" name="Gewinkelte Verbindung 42">
-            <a:extLst>
-              <a:ext uri="{FF2B5EF4-FFF2-40B4-BE49-F238E27FC236}">
-                <a16:creationId xmlns:a16="http://schemas.microsoft.com/office/drawing/2014/main" id="{71E604D1-FBA1-D24B-94FD-4EB1DC0087C1}"/>
-              </a:ext>
-            </a:extLst>
-          </p:cNvPr>
-          <p:cNvCxnSpPr>
-            <a:cxnSpLocks/>
-          </p:cNvCxnSpPr>
-          <p:nvPr/>
-        </p:nvCxnSpPr>
-        <p:spPr>
-          <a:xfrm>
-            <a:off x="5948948" y="3740424"/>
-            <a:ext cx="2311216" cy="554366"/>
-          </a:xfrm>
-          <a:prstGeom prst="bentConnector3">
-            <a:avLst>
-              <a:gd name="adj1" fmla="val 100095"/>
-            </a:avLst>
-          </a:prstGeom>
-          <a:ln w="19050" cap="rnd" cmpd="sng">
-            <a:solidFill>
-              <a:schemeClr val="tx1">
-                <a:lumMod val="65000"/>
-                <a:lumOff val="35000"/>
-              </a:schemeClr>
-            </a:solidFill>
-            <a:round/>
-            <a:headEnd type="none" w="med" len="med"/>
-            <a:tailEnd type="triangle" w="med" len="med"/>
-          </a:ln>
-        </p:spPr>
-        <p:style>
-          <a:lnRef idx="1">
-            <a:schemeClr val="accent1"/>
-          </a:lnRef>
-          <a:fillRef idx="0">
-            <a:schemeClr val="accent1"/>
-          </a:fillRef>
-          <a:effectRef idx="0">
-            <a:schemeClr val="accent1"/>
-          </a:effectRef>
-          <a:fontRef idx="minor">
-            <a:schemeClr val="tx1"/>
-          </a:fontRef>
-        </p:style>
-      </p:cxnSp>
-      <p:cxnSp>
-        <p:nvCxnSpPr>
-          <p:cNvPr id="95" name="Gewinkelte Verbindung 42">
-            <a:extLst>
-              <a:ext uri="{FF2B5EF4-FFF2-40B4-BE49-F238E27FC236}">
-                <a16:creationId xmlns:a16="http://schemas.microsoft.com/office/drawing/2014/main" id="{356B6331-1B44-5149-9ACB-9AE9A3162CF0}"/>
-              </a:ext>
-            </a:extLst>
-          </p:cNvPr>
-          <p:cNvCxnSpPr>
-            <a:cxnSpLocks/>
-          </p:cNvCxnSpPr>
-          <p:nvPr/>
-        </p:nvCxnSpPr>
-        <p:spPr>
-          <a:xfrm flipV="1">
-            <a:off x="8408920" y="3740424"/>
-            <a:ext cx="2015515" cy="554366"/>
-          </a:xfrm>
-          <a:prstGeom prst="bentConnector3">
-            <a:avLst>
-              <a:gd name="adj1" fmla="val 63"/>
-            </a:avLst>
-          </a:prstGeom>
-          <a:ln w="19050" cap="rnd" cmpd="sng">
-            <a:solidFill>
-              <a:schemeClr val="tx1">
-                <a:lumMod val="65000"/>
-                <a:lumOff val="35000"/>
-              </a:schemeClr>
-            </a:solidFill>
-            <a:round/>
-            <a:headEnd type="none" w="med" len="med"/>
-            <a:tailEnd type="triangle" w="med" len="med"/>
-          </a:ln>
-        </p:spPr>
-        <p:style>
-          <a:lnRef idx="1">
-            <a:schemeClr val="accent1"/>
-          </a:lnRef>
-          <a:fillRef idx="0">
-            <a:schemeClr val="accent1"/>
-          </a:fillRef>
-          <a:effectRef idx="0">
-            <a:schemeClr val="accent1"/>
-          </a:effectRef>
-          <a:fontRef idx="minor">
-            <a:schemeClr val="tx1"/>
-          </a:fontRef>
-        </p:style>
-      </p:cxnSp>
-      <p:sp>
-        <p:nvSpPr>
-          <p:cNvPr id="102" name="Rechteck 61">
-            <a:extLst>
-              <a:ext uri="{FF2B5EF4-FFF2-40B4-BE49-F238E27FC236}">
-                <a16:creationId xmlns:a16="http://schemas.microsoft.com/office/drawing/2014/main" id="{9940339F-A396-EA4A-9084-64C46C06D769}"/>
-              </a:ext>
-            </a:extLst>
-          </p:cNvPr>
-          <p:cNvSpPr/>
-          <p:nvPr/>
-        </p:nvSpPr>
-        <p:spPr>
-          <a:xfrm>
-            <a:off x="2594591" y="3079142"/>
-            <a:ext cx="1041317" cy="456045"/>
-          </a:xfrm>
-          <a:prstGeom prst="rect">
-            <a:avLst/>
-          </a:prstGeom>
-          <a:solidFill>
-            <a:schemeClr val="bg1"/>
-          </a:solidFill>
-          <a:ln w="12700">
-            <a:solidFill>
-              <a:srgbClr val="1A9898"/>
-            </a:solidFill>
-          </a:ln>
-          <a:effectLst/>
-        </p:spPr>
-        <p:style>
-          <a:lnRef idx="2">
-            <a:schemeClr val="accent1">
-              <a:shade val="50000"/>
-            </a:schemeClr>
-          </a:lnRef>
-          <a:fillRef idx="1">
-            <a:schemeClr val="accent1"/>
-          </a:fillRef>
-          <a:effectRef idx="0">
-            <a:schemeClr val="accent1"/>
-          </a:effectRef>
-          <a:fontRef idx="minor">
-            <a:schemeClr val="lt1"/>
-          </a:fontRef>
-        </p:style>
-        <p:txBody>
-          <a:bodyPr lIns="72000" tIns="72000" rIns="72000" bIns="72000" rtlCol="0" anchor="ctr" anchorCtr="0"/>
-          <a:lstStyle/>
-          <a:p>
-            <a:pPr algn="ctr"/>
-            <a:r>
-              <a:rPr lang="en-US" sz="800" kern="0" dirty="0">
-                <a:solidFill>
-                  <a:schemeClr val="tx1"/>
-                </a:solidFill>
-                <a:latin typeface="Arial" panose="020B0604020202020204" pitchFamily="34" charset="0"/>
-                <a:ea typeface="BentonSans Bold" charset="0"/>
-                <a:cs typeface="Arial" panose="020B0604020202020204" pitchFamily="34" charset="0"/>
-              </a:rPr>
-              <a:t>Broker</a:t>
-            </a:r>
-          </a:p>
-        </p:txBody>
-      </p:sp>
-      <p:sp>
-        <p:nvSpPr>
-          <p:cNvPr id="104" name="TextBox 103">
-            <a:extLst>
-              <a:ext uri="{FF2B5EF4-FFF2-40B4-BE49-F238E27FC236}">
-                <a16:creationId xmlns:a16="http://schemas.microsoft.com/office/drawing/2014/main" id="{66EAE5E3-A715-1049-AD68-DF79996798A9}"/>
-              </a:ext>
-            </a:extLst>
-          </p:cNvPr>
-          <p:cNvSpPr txBox="1"/>
-          <p:nvPr/>
-        </p:nvSpPr>
-        <p:spPr>
-          <a:xfrm>
-            <a:off x="3069750" y="1892283"/>
-            <a:ext cx="1819729" cy="215444"/>
-          </a:xfrm>
-          <a:prstGeom prst="rect">
-            <a:avLst/>
-          </a:prstGeom>
-          <a:solidFill>
-            <a:schemeClr val="accent5">
-              <a:lumMod val="20000"/>
-              <a:lumOff val="80000"/>
-            </a:schemeClr>
-          </a:solidFill>
-        </p:spPr>
-        <p:txBody>
-          <a:bodyPr wrap="none" rtlCol="0">
-            <a:spAutoFit/>
-          </a:bodyPr>
-          <a:lstStyle/>
-          <a:p>
-            <a:r>
-              <a:rPr lang="en-DE" sz="800" b="1" dirty="0">
-                <a:solidFill>
-                  <a:schemeClr val="tx1">
-                    <a:lumMod val="50000"/>
-                    <a:lumOff val="50000"/>
-                  </a:schemeClr>
-                </a:solidFill>
-              </a:rPr>
-              <a:t>Multitenant Application Microservices</a:t>
-            </a:r>
-          </a:p>
-        </p:txBody>
-      </p:sp>
-      <p:sp>
-        <p:nvSpPr>
-          <p:cNvPr id="105" name="Rechteck 61">
-            <a:extLst>
-              <a:ext uri="{FF2B5EF4-FFF2-40B4-BE49-F238E27FC236}">
-                <a16:creationId xmlns:a16="http://schemas.microsoft.com/office/drawing/2014/main" id="{08DF21A6-1ADF-DA4E-84F6-AAF7DFA1D78B}"/>
-              </a:ext>
-            </a:extLst>
-          </p:cNvPr>
-          <p:cNvSpPr/>
-          <p:nvPr/>
-        </p:nvSpPr>
-        <p:spPr>
-          <a:xfrm>
-            <a:off x="4207913" y="2550908"/>
-            <a:ext cx="1041317" cy="456045"/>
-          </a:xfrm>
-          <a:prstGeom prst="rect">
-            <a:avLst/>
-          </a:prstGeom>
-          <a:solidFill>
-            <a:schemeClr val="bg1"/>
-          </a:solidFill>
-          <a:ln w="12700">
-            <a:solidFill>
-              <a:srgbClr val="1A9898"/>
-            </a:solidFill>
-          </a:ln>
-          <a:effectLst/>
-        </p:spPr>
-        <p:style>
-          <a:lnRef idx="2">
-            <a:schemeClr val="accent1">
-              <a:shade val="50000"/>
-            </a:schemeClr>
-          </a:lnRef>
-          <a:fillRef idx="1">
-            <a:schemeClr val="accent1"/>
-          </a:fillRef>
-          <a:effectRef idx="0">
-            <a:schemeClr val="accent1"/>
-          </a:effectRef>
-          <a:fontRef idx="minor">
-            <a:schemeClr val="lt1"/>
-          </a:fontRef>
-        </p:style>
-        <p:txBody>
-          <a:bodyPr lIns="72000" tIns="72000" rIns="72000" bIns="72000" rtlCol="0" anchor="ctr" anchorCtr="0"/>
-          <a:lstStyle/>
-          <a:p>
-            <a:pPr algn="ctr"/>
-            <a:r>
-              <a:rPr lang="en-US" sz="800" kern="0" dirty="0">
-                <a:solidFill>
-                  <a:schemeClr val="tx1"/>
-                </a:solidFill>
-                <a:latin typeface="Arial" panose="020B0604020202020204" pitchFamily="34" charset="0"/>
-                <a:ea typeface="BentonSans Bold" charset="0"/>
-                <a:cs typeface="Arial" panose="020B0604020202020204" pitchFamily="34" charset="0"/>
-              </a:rPr>
-              <a:t>Microservices</a:t>
-            </a:r>
-          </a:p>
-        </p:txBody>
-      </p:sp>
-      <p:sp>
-        <p:nvSpPr>
-          <p:cNvPr id="106" name="Rechteck 61">
-            <a:extLst>
-              <a:ext uri="{FF2B5EF4-FFF2-40B4-BE49-F238E27FC236}">
-                <a16:creationId xmlns:a16="http://schemas.microsoft.com/office/drawing/2014/main" id="{2788AE44-3118-7D4C-AE70-9BF5611321AF}"/>
-              </a:ext>
-            </a:extLst>
-          </p:cNvPr>
-          <p:cNvSpPr/>
-          <p:nvPr/>
-        </p:nvSpPr>
-        <p:spPr>
-          <a:xfrm>
-            <a:off x="4128999" y="2474708"/>
-            <a:ext cx="1041317" cy="456045"/>
-          </a:xfrm>
-          <a:prstGeom prst="rect">
-            <a:avLst/>
-          </a:prstGeom>
-          <a:solidFill>
-            <a:schemeClr val="bg1"/>
-          </a:solidFill>
-          <a:ln w="12700">
-            <a:solidFill>
-              <a:srgbClr val="1A9898"/>
-            </a:solidFill>
-          </a:ln>
-          <a:effectLst/>
-        </p:spPr>
-        <p:style>
-          <a:lnRef idx="2">
-            <a:schemeClr val="accent1">
-              <a:shade val="50000"/>
-            </a:schemeClr>
-          </a:lnRef>
-          <a:fillRef idx="1">
-            <a:schemeClr val="accent1"/>
-          </a:fillRef>
-          <a:effectRef idx="0">
-            <a:schemeClr val="accent1"/>
-          </a:effectRef>
-          <a:fontRef idx="minor">
-            <a:schemeClr val="lt1"/>
-          </a:fontRef>
-        </p:style>
-        <p:txBody>
-          <a:bodyPr lIns="72000" tIns="72000" rIns="72000" bIns="72000" rtlCol="0" anchor="ctr" anchorCtr="0"/>
-          <a:lstStyle/>
-          <a:p>
-            <a:pPr algn="ctr"/>
-            <a:r>
-              <a:rPr lang="en-US" sz="800" kern="0" dirty="0">
-                <a:solidFill>
-                  <a:schemeClr val="tx1"/>
-                </a:solidFill>
-                <a:latin typeface="Arial" panose="020B0604020202020204" pitchFamily="34" charset="0"/>
-                <a:ea typeface="BentonSans Bold" charset="0"/>
-                <a:cs typeface="Arial" panose="020B0604020202020204" pitchFamily="34" charset="0"/>
-              </a:rPr>
-              <a:t>Microservices</a:t>
-            </a:r>
-          </a:p>
-        </p:txBody>
-      </p:sp>
-      <p:sp>
-        <p:nvSpPr>
-          <p:cNvPr id="112" name="Rechteck 44">
-            <a:extLst>
-              <a:ext uri="{FF2B5EF4-FFF2-40B4-BE49-F238E27FC236}">
-                <a16:creationId xmlns:a16="http://schemas.microsoft.com/office/drawing/2014/main" id="{C1657FF2-5FDA-A744-8693-709AA60FB656}"/>
-              </a:ext>
-            </a:extLst>
-          </p:cNvPr>
-          <p:cNvSpPr/>
-          <p:nvPr/>
-        </p:nvSpPr>
-        <p:spPr>
-          <a:xfrm>
-            <a:off x="2478882" y="5002010"/>
-            <a:ext cx="513115" cy="123111"/>
-          </a:xfrm>
-          <a:prstGeom prst="rect">
-            <a:avLst/>
-          </a:prstGeom>
-        </p:spPr>
-        <p:txBody>
-          <a:bodyPr wrap="square" lIns="0" tIns="0" rIns="0" bIns="0">
-            <a:spAutoFit/>
-          </a:bodyPr>
-          <a:lstStyle/>
-          <a:p>
-            <a:pPr algn="ctr"/>
-            <a:r>
-              <a:rPr lang="en-US" sz="800" b="1" dirty="0">
-                <a:solidFill>
-                  <a:srgbClr val="427CAC"/>
-                </a:solidFill>
-                <a:latin typeface="Arial" charset="0"/>
-                <a:ea typeface="Arial" charset="0"/>
-                <a:cs typeface="Arial" charset="0"/>
-              </a:rPr>
-              <a:t>XSUAA</a:t>
-            </a:r>
-          </a:p>
-        </p:txBody>
-      </p:sp>
-      <p:pic>
-        <p:nvPicPr>
-          <p:cNvPr id="113" name="Bild 36">
-            <a:extLst>
-              <a:ext uri="{FF2B5EF4-FFF2-40B4-BE49-F238E27FC236}">
-                <a16:creationId xmlns:a16="http://schemas.microsoft.com/office/drawing/2014/main" id="{CB5EBAAD-E85C-294E-9FC3-D8ADFC7295D2}"/>
-              </a:ext>
-            </a:extLst>
-          </p:cNvPr>
-          <p:cNvPicPr>
-            <a:picLocks noChangeAspect="1"/>
-          </p:cNvPicPr>
-          <p:nvPr/>
-        </p:nvPicPr>
-        <p:blipFill>
-          <a:blip r:embed="rId6">
-            <a:extLst>
-              <a:ext uri="{28A0092B-C50C-407E-A947-70E740481C1C}">
-                <a14:useLocalDpi xmlns:a14="http://schemas.microsoft.com/office/drawing/2010/main" val="0"/>
-              </a:ext>
-            </a:extLst>
-          </a:blip>
-          <a:stretch>
-            <a:fillRect/>
-          </a:stretch>
-        </p:blipFill>
-        <p:spPr>
-          <a:xfrm>
-            <a:off x="2615054" y="4623829"/>
-            <a:ext cx="259739" cy="259739"/>
-          </a:xfrm>
-          <a:prstGeom prst="rect">
-            <a:avLst/>
-          </a:prstGeom>
-        </p:spPr>
-      </p:pic>
-      <p:sp>
-        <p:nvSpPr>
-          <p:cNvPr id="114" name="Oval 113">
-            <a:extLst>
-              <a:ext uri="{FF2B5EF4-FFF2-40B4-BE49-F238E27FC236}">
-                <a16:creationId xmlns:a16="http://schemas.microsoft.com/office/drawing/2014/main" id="{8693FA51-4CCB-6546-91CD-130B98852365}"/>
-              </a:ext>
-            </a:extLst>
-          </p:cNvPr>
-          <p:cNvSpPr/>
-          <p:nvPr/>
-        </p:nvSpPr>
-        <p:spPr>
-          <a:xfrm>
-            <a:off x="2550194" y="4562214"/>
-            <a:ext cx="386787" cy="392724"/>
-          </a:xfrm>
-          <a:prstGeom prst="ellipse">
-            <a:avLst/>
-          </a:prstGeom>
-          <a:noFill/>
-          <a:ln w="22860">
-            <a:solidFill>
-              <a:schemeClr val="accent5">
-                <a:lumMod val="75000"/>
-              </a:schemeClr>
-            </a:solidFill>
-          </a:ln>
-        </p:spPr>
-        <p:style>
-          <a:lnRef idx="2">
-            <a:schemeClr val="accent1">
-              <a:shade val="50000"/>
-            </a:schemeClr>
-          </a:lnRef>
-          <a:fillRef idx="1">
-            <a:schemeClr val="accent1"/>
-          </a:fillRef>
-          <a:effectRef idx="0">
-            <a:schemeClr val="accent1"/>
-          </a:effectRef>
-          <a:fontRef idx="minor">
-            <a:schemeClr val="lt1"/>
-          </a:fontRef>
-        </p:style>
-        <p:txBody>
-          <a:bodyPr rtlCol="0" anchor="ctr"/>
-          <a:lstStyle/>
-          <a:p>
-            <a:pPr algn="ctr"/>
-            <a:endParaRPr lang="en-DE"/>
-          </a:p>
-        </p:txBody>
-      </p:sp>
-      <p:sp>
-        <p:nvSpPr>
-          <p:cNvPr id="115" name="Rechteck 44">
-            <a:extLst>
-              <a:ext uri="{FF2B5EF4-FFF2-40B4-BE49-F238E27FC236}">
-                <a16:creationId xmlns:a16="http://schemas.microsoft.com/office/drawing/2014/main" id="{76F3C1FB-41E3-AE4A-826C-22FFC4F0B064}"/>
-              </a:ext>
-            </a:extLst>
-          </p:cNvPr>
-          <p:cNvSpPr/>
-          <p:nvPr/>
-        </p:nvSpPr>
-        <p:spPr>
-          <a:xfrm>
-            <a:off x="3630630" y="5002010"/>
-            <a:ext cx="513115" cy="246221"/>
-          </a:xfrm>
-          <a:prstGeom prst="rect">
-            <a:avLst/>
-          </a:prstGeom>
-        </p:spPr>
-        <p:txBody>
-          <a:bodyPr wrap="square" lIns="0" tIns="0" rIns="0" bIns="0">
-            <a:spAutoFit/>
-          </a:bodyPr>
-          <a:lstStyle/>
-          <a:p>
-            <a:pPr algn="ctr"/>
-            <a:r>
-              <a:rPr lang="en-US" sz="800" b="1" dirty="0">
-                <a:solidFill>
-                  <a:srgbClr val="427CAC"/>
-                </a:solidFill>
-                <a:latin typeface="Arial" charset="0"/>
-                <a:ea typeface="Arial" charset="0"/>
-                <a:cs typeface="Arial" charset="0"/>
-              </a:rPr>
-              <a:t>SaaS Registry</a:t>
-            </a:r>
-          </a:p>
-        </p:txBody>
-      </p:sp>
-      <p:pic>
-        <p:nvPicPr>
-          <p:cNvPr id="116" name="Bild 36">
-            <a:extLst>
-              <a:ext uri="{FF2B5EF4-FFF2-40B4-BE49-F238E27FC236}">
-                <a16:creationId xmlns:a16="http://schemas.microsoft.com/office/drawing/2014/main" id="{16A02DE4-44D2-7A44-8342-E2CB28254F6B}"/>
-              </a:ext>
-            </a:extLst>
-          </p:cNvPr>
-          <p:cNvPicPr>
-            <a:picLocks noChangeAspect="1"/>
-          </p:cNvPicPr>
-          <p:nvPr/>
-        </p:nvPicPr>
-        <p:blipFill>
-          <a:blip r:embed="rId6">
-            <a:extLst>
-              <a:ext uri="{28A0092B-C50C-407E-A947-70E740481C1C}">
-                <a14:useLocalDpi xmlns:a14="http://schemas.microsoft.com/office/drawing/2010/main" val="0"/>
-              </a:ext>
-            </a:extLst>
-          </a:blip>
-          <a:stretch>
-            <a:fillRect/>
-          </a:stretch>
-        </p:blipFill>
-        <p:spPr>
-          <a:xfrm>
-            <a:off x="3766802" y="4623829"/>
-            <a:ext cx="259739" cy="259739"/>
-          </a:xfrm>
-          <a:prstGeom prst="rect">
-            <a:avLst/>
-          </a:prstGeom>
-        </p:spPr>
-      </p:pic>
-      <p:sp>
-        <p:nvSpPr>
-          <p:cNvPr id="117" name="Oval 116">
-            <a:extLst>
-              <a:ext uri="{FF2B5EF4-FFF2-40B4-BE49-F238E27FC236}">
-                <a16:creationId xmlns:a16="http://schemas.microsoft.com/office/drawing/2014/main" id="{59D95624-E14B-6344-BA4A-349073213678}"/>
-              </a:ext>
-            </a:extLst>
-          </p:cNvPr>
-          <p:cNvSpPr/>
-          <p:nvPr/>
-        </p:nvSpPr>
-        <p:spPr>
-          <a:xfrm>
-            <a:off x="3701942" y="4562214"/>
-            <a:ext cx="386787" cy="392724"/>
-          </a:xfrm>
-          <a:prstGeom prst="ellipse">
-            <a:avLst/>
-          </a:prstGeom>
-          <a:noFill/>
-          <a:ln w="22860">
-            <a:solidFill>
-              <a:schemeClr val="accent5">
-                <a:lumMod val="75000"/>
-              </a:schemeClr>
-            </a:solidFill>
-          </a:ln>
-        </p:spPr>
-        <p:style>
-          <a:lnRef idx="2">
-            <a:schemeClr val="accent1">
-              <a:shade val="50000"/>
-            </a:schemeClr>
-          </a:lnRef>
-          <a:fillRef idx="1">
-            <a:schemeClr val="accent1"/>
-          </a:fillRef>
-          <a:effectRef idx="0">
-            <a:schemeClr val="accent1"/>
-          </a:effectRef>
-          <a:fontRef idx="minor">
-            <a:schemeClr val="lt1"/>
-          </a:fontRef>
-        </p:style>
-        <p:txBody>
-          <a:bodyPr rtlCol="0" anchor="ctr"/>
-          <a:lstStyle/>
-          <a:p>
-            <a:pPr algn="ctr"/>
-            <a:endParaRPr lang="en-DE"/>
-          </a:p>
-        </p:txBody>
-      </p:sp>
-      <p:sp>
-        <p:nvSpPr>
-          <p:cNvPr id="118" name="Rechteck 44">
-            <a:extLst>
-              <a:ext uri="{FF2B5EF4-FFF2-40B4-BE49-F238E27FC236}">
-                <a16:creationId xmlns:a16="http://schemas.microsoft.com/office/drawing/2014/main" id="{5D1AD4DE-DCDB-FA41-AB57-0D54A6981ACC}"/>
-              </a:ext>
-            </a:extLst>
-          </p:cNvPr>
-          <p:cNvSpPr/>
-          <p:nvPr/>
-        </p:nvSpPr>
-        <p:spPr>
-          <a:xfrm>
-            <a:off x="4740094" y="4995447"/>
-            <a:ext cx="612886" cy="123111"/>
-          </a:xfrm>
-          <a:prstGeom prst="rect">
-            <a:avLst/>
-          </a:prstGeom>
-        </p:spPr>
-        <p:txBody>
-          <a:bodyPr wrap="square" lIns="0" tIns="0" rIns="0" bIns="0">
-            <a:spAutoFit/>
-          </a:bodyPr>
-          <a:lstStyle/>
-          <a:p>
-            <a:pPr algn="ctr"/>
-            <a:r>
-              <a:rPr lang="en-US" sz="800" b="1" dirty="0">
-                <a:solidFill>
-                  <a:srgbClr val="427CAC"/>
-                </a:solidFill>
-                <a:latin typeface="Arial" charset="0"/>
-                <a:ea typeface="Arial" charset="0"/>
-                <a:cs typeface="Arial" charset="0"/>
-              </a:rPr>
-              <a:t>Destination</a:t>
-            </a:r>
-          </a:p>
-        </p:txBody>
-      </p:sp>
-      <p:pic>
-        <p:nvPicPr>
-          <p:cNvPr id="119" name="Bild 36">
-            <a:extLst>
-              <a:ext uri="{FF2B5EF4-FFF2-40B4-BE49-F238E27FC236}">
-                <a16:creationId xmlns:a16="http://schemas.microsoft.com/office/drawing/2014/main" id="{AEB88F5D-4F11-7D44-A73E-82708FF90D18}"/>
-              </a:ext>
-            </a:extLst>
-          </p:cNvPr>
-          <p:cNvPicPr>
-            <a:picLocks noChangeAspect="1"/>
-          </p:cNvPicPr>
-          <p:nvPr/>
-        </p:nvPicPr>
-        <p:blipFill>
-          <a:blip r:embed="rId6">
-            <a:extLst>
-              <a:ext uri="{28A0092B-C50C-407E-A947-70E740481C1C}">
-                <a14:useLocalDpi xmlns:a14="http://schemas.microsoft.com/office/drawing/2010/main" val="0"/>
-              </a:ext>
-            </a:extLst>
-          </a:blip>
-          <a:stretch>
-            <a:fillRect/>
-          </a:stretch>
-        </p:blipFill>
-        <p:spPr>
-          <a:xfrm>
-            <a:off x="4918004" y="4623829"/>
-            <a:ext cx="259739" cy="259739"/>
-          </a:xfrm>
-          <a:prstGeom prst="rect">
-            <a:avLst/>
-          </a:prstGeom>
-        </p:spPr>
-      </p:pic>
-      <p:sp>
-        <p:nvSpPr>
-          <p:cNvPr id="120" name="Oval 119">
-            <a:extLst>
-              <a:ext uri="{FF2B5EF4-FFF2-40B4-BE49-F238E27FC236}">
-                <a16:creationId xmlns:a16="http://schemas.microsoft.com/office/drawing/2014/main" id="{9D6BE1CD-62CD-4E43-989E-D3F980362888}"/>
-              </a:ext>
-            </a:extLst>
-          </p:cNvPr>
-          <p:cNvSpPr/>
-          <p:nvPr/>
-        </p:nvSpPr>
-        <p:spPr>
-          <a:xfrm>
-            <a:off x="4853144" y="4562214"/>
-            <a:ext cx="386787" cy="392724"/>
-          </a:xfrm>
-          <a:prstGeom prst="ellipse">
-            <a:avLst/>
-          </a:prstGeom>
-          <a:noFill/>
-          <a:ln w="22860">
-            <a:solidFill>
-              <a:schemeClr val="accent5">
-                <a:lumMod val="75000"/>
-              </a:schemeClr>
-            </a:solidFill>
-          </a:ln>
-        </p:spPr>
-        <p:style>
-          <a:lnRef idx="2">
-            <a:schemeClr val="accent1">
-              <a:shade val="50000"/>
-            </a:schemeClr>
-          </a:lnRef>
-          <a:fillRef idx="1">
-            <a:schemeClr val="accent1"/>
-          </a:fillRef>
-          <a:effectRef idx="0">
-            <a:schemeClr val="accent1"/>
-          </a:effectRef>
-          <a:fontRef idx="minor">
-            <a:schemeClr val="lt1"/>
-          </a:fontRef>
-        </p:style>
-        <p:txBody>
-          <a:bodyPr rtlCol="0" anchor="ctr"/>
-          <a:lstStyle/>
-          <a:p>
-            <a:pPr algn="ctr"/>
-            <a:endParaRPr lang="en-DE"/>
-          </a:p>
-        </p:txBody>
-      </p:sp>
     </p:spTree>
     <p:extLst>
       <p:ext uri="{BB962C8B-B14F-4D97-AF65-F5344CB8AC3E}">
@@ -9140,7 +6697,7 @@
           <p:nvPr/>
         </p:nvPicPr>
         <p:blipFill rotWithShape="1">
-          <a:blip r:embed="rId2">
+          <a:blip r:embed="rId3">
             <a:extLst>
               <a:ext uri="{28A0092B-C50C-407E-A947-70E740481C1C}">
                 <a14:useLocalDpi xmlns:a14="http://schemas.microsoft.com/office/drawing/2010/main" val="0"/>
@@ -9406,7 +6963,7 @@
           <p:nvPr/>
         </p:nvPicPr>
         <p:blipFill>
-          <a:blip r:embed="rId3">
+          <a:blip r:embed="rId4">
             <a:extLst>
               <a:ext uri="{28A0092B-C50C-407E-A947-70E740481C1C}">
                 <a14:useLocalDpi xmlns:a14="http://schemas.microsoft.com/office/drawing/2010/main" val="0"/>
@@ -9490,53 +7047,6 @@
           </a:p>
         </p:txBody>
       </p:sp>
-      <p:pic>
-        <p:nvPicPr>
-          <p:cNvPr id="1028" name="Picture 4" descr="Cloud Foundry – Open Source Cloud Native Application Delivery">
-            <a:extLst>
-              <a:ext uri="{FF2B5EF4-FFF2-40B4-BE49-F238E27FC236}">
-                <a16:creationId xmlns:a16="http://schemas.microsoft.com/office/drawing/2014/main" id="{CBEBA09B-CC6D-5448-9FCE-CEB7170E6C16}"/>
-              </a:ext>
-            </a:extLst>
-          </p:cNvPr>
-          <p:cNvPicPr>
-            <a:picLocks noChangeAspect="1" noChangeArrowheads="1"/>
-          </p:cNvPicPr>
-          <p:nvPr/>
-        </p:nvPicPr>
-        <p:blipFill>
-          <a:blip r:embed="rId4">
-            <a:extLst>
-              <a:ext uri="{28A0092B-C50C-407E-A947-70E740481C1C}">
-                <a14:useLocalDpi xmlns:a14="http://schemas.microsoft.com/office/drawing/2010/main" val="0"/>
-              </a:ext>
-            </a:extLst>
-          </a:blip>
-          <a:srcRect/>
-          <a:stretch>
-            <a:fillRect/>
-          </a:stretch>
-        </p:blipFill>
-        <p:spPr bwMode="auto">
-          <a:xfrm>
-            <a:off x="6482349" y="1602012"/>
-            <a:ext cx="1063096" cy="145345"/>
-          </a:xfrm>
-          <a:prstGeom prst="rect">
-            <a:avLst/>
-          </a:prstGeom>
-          <a:noFill/>
-          <a:extLst>
-            <a:ext uri="{909E8E84-426E-40DD-AFC4-6F175D3DCCD1}">
-              <a14:hiddenFill xmlns:a14="http://schemas.microsoft.com/office/drawing/2010/main">
-                <a:solidFill>
-                  <a:srgbClr val="FFFFFF"/>
-                </a:solidFill>
-              </a14:hiddenFill>
-            </a:ext>
-          </a:extLst>
-        </p:spPr>
-      </p:pic>
       <p:sp>
         <p:nvSpPr>
           <p:cNvPr id="25" name="Rectangle 24">
@@ -10556,7 +8066,7 @@
         <p:spPr>
           <a:xfrm>
             <a:off x="6557325" y="1943462"/>
-            <a:ext cx="894797" cy="215444"/>
+            <a:ext cx="947695" cy="215444"/>
           </a:xfrm>
           <a:prstGeom prst="rect">
             <a:avLst/>
@@ -10570,7 +8080,7 @@
           <a:lstStyle/>
           <a:p>
             <a:r>
-              <a:rPr lang="en-DE" sz="800" b="1" dirty="0">
+              <a:rPr lang="en-US" sz="800" b="1" dirty="0">
                 <a:solidFill>
                   <a:schemeClr val="tx1">
                     <a:lumMod val="50000"/>
@@ -10578,8 +8088,16 @@
                   </a:schemeClr>
                 </a:solidFill>
               </a:rPr>
-              <a:t>SAP HANA Cloud</a:t>
-            </a:r>
+              <a:t>Easy Franchise DB</a:t>
+            </a:r>
+            <a:endParaRPr lang="en-DE" sz="800" b="1" dirty="0">
+              <a:solidFill>
+                <a:schemeClr val="tx1">
+                  <a:lumMod val="50000"/>
+                  <a:lumOff val="50000"/>
+                </a:schemeClr>
+              </a:solidFill>
+            </a:endParaRPr>
           </a:p>
         </p:txBody>
       </p:sp>
@@ -11681,6 +9199,50 @@
           </a:fontRef>
         </p:style>
       </p:cxnSp>
+      <p:sp>
+        <p:nvSpPr>
+          <p:cNvPr id="5" name="TextBox 4">
+            <a:extLst>
+              <a:ext uri="{FF2B5EF4-FFF2-40B4-BE49-F238E27FC236}">
+                <a16:creationId xmlns:a16="http://schemas.microsoft.com/office/drawing/2014/main" id="{BD45996B-BA17-4984-975F-73DE407799D6}"/>
+              </a:ext>
+            </a:extLst>
+          </p:cNvPr>
+          <p:cNvSpPr txBox="1"/>
+          <p:nvPr/>
+        </p:nvSpPr>
+        <p:spPr>
+          <a:xfrm>
+            <a:off x="6443895" y="1572048"/>
+            <a:ext cx="2647483" cy="246221"/>
+          </a:xfrm>
+          <a:prstGeom prst="rect">
+            <a:avLst/>
+          </a:prstGeom>
+          <a:noFill/>
+        </p:spPr>
+        <p:txBody>
+          <a:bodyPr wrap="square" rtlCol="0">
+            <a:spAutoFit/>
+          </a:bodyPr>
+          <a:lstStyle/>
+          <a:p>
+            <a:r>
+              <a:rPr lang="en-US" sz="1000" b="1" dirty="0">
+                <a:solidFill>
+                  <a:srgbClr val="5B9BD5"/>
+                </a:solidFill>
+              </a:rPr>
+              <a:t>SAP HANA Cloud</a:t>
+            </a:r>
+            <a:endParaRPr lang="de-DE" sz="1000" b="1" dirty="0">
+              <a:solidFill>
+                <a:srgbClr val="5B9BD5"/>
+              </a:solidFill>
+            </a:endParaRPr>
+          </a:p>
+        </p:txBody>
+      </p:sp>
     </p:spTree>
     <p:extLst>
       <p:ext uri="{BB962C8B-B14F-4D97-AF65-F5344CB8AC3E}">
@@ -12792,53 +10354,6 @@
           </a:p>
         </p:txBody>
       </p:sp>
-      <p:pic>
-        <p:nvPicPr>
-          <p:cNvPr id="1028" name="Picture 4" descr="Cloud Foundry – Open Source Cloud Native Application Delivery">
-            <a:extLst>
-              <a:ext uri="{FF2B5EF4-FFF2-40B4-BE49-F238E27FC236}">
-                <a16:creationId xmlns:a16="http://schemas.microsoft.com/office/drawing/2014/main" id="{CBEBA09B-CC6D-5448-9FCE-CEB7170E6C16}"/>
-              </a:ext>
-            </a:extLst>
-          </p:cNvPr>
-          <p:cNvPicPr>
-            <a:picLocks noChangeAspect="1" noChangeArrowheads="1"/>
-          </p:cNvPicPr>
-          <p:nvPr/>
-        </p:nvPicPr>
-        <p:blipFill>
-          <a:blip r:embed="rId4">
-            <a:extLst>
-              <a:ext uri="{28A0092B-C50C-407E-A947-70E740481C1C}">
-                <a14:useLocalDpi xmlns:a14="http://schemas.microsoft.com/office/drawing/2010/main" val="0"/>
-              </a:ext>
-            </a:extLst>
-          </a:blip>
-          <a:srcRect/>
-          <a:stretch>
-            <a:fillRect/>
-          </a:stretch>
-        </p:blipFill>
-        <p:spPr bwMode="auto">
-          <a:xfrm>
-            <a:off x="6482349" y="1602012"/>
-            <a:ext cx="1063096" cy="145345"/>
-          </a:xfrm>
-          <a:prstGeom prst="rect">
-            <a:avLst/>
-          </a:prstGeom>
-          <a:noFill/>
-          <a:extLst>
-            <a:ext uri="{909E8E84-426E-40DD-AFC4-6F175D3DCCD1}">
-              <a14:hiddenFill xmlns:a14="http://schemas.microsoft.com/office/drawing/2010/main">
-                <a:solidFill>
-                  <a:srgbClr val="FFFFFF"/>
-                </a:solidFill>
-              </a14:hiddenFill>
-            </a:ext>
-          </a:extLst>
-        </p:spPr>
-      </p:pic>
       <p:sp>
         <p:nvSpPr>
           <p:cNvPr id="25" name="Rectangle 24">
@@ -13681,7 +11196,7 @@
           <p:nvPr/>
         </p:nvPicPr>
         <p:blipFill>
-          <a:blip r:embed="rId5">
+          <a:blip r:embed="rId4">
             <a:extLst>
               <a:ext uri="{28A0092B-C50C-407E-A947-70E740481C1C}">
                 <a14:useLocalDpi xmlns:a14="http://schemas.microsoft.com/office/drawing/2010/main" val="0"/>
@@ -13728,7 +11243,7 @@
           <p:nvPr/>
         </p:nvPicPr>
         <p:blipFill>
-          <a:blip r:embed="rId5">
+          <a:blip r:embed="rId4">
             <a:extLst>
               <a:ext uri="{28A0092B-C50C-407E-A947-70E740481C1C}">
                 <a14:useLocalDpi xmlns:a14="http://schemas.microsoft.com/office/drawing/2010/main" val="0"/>
@@ -13775,7 +11290,7 @@
           <p:nvPr/>
         </p:nvPicPr>
         <p:blipFill>
-          <a:blip r:embed="rId6">
+          <a:blip r:embed="rId5">
             <a:extLst>
               <a:ext uri="{28A0092B-C50C-407E-A947-70E740481C1C}">
                 <a14:useLocalDpi xmlns:a14="http://schemas.microsoft.com/office/drawing/2010/main" val="0"/>
@@ -13884,7 +11399,7 @@
         <p:spPr>
           <a:xfrm>
             <a:off x="6557325" y="1943462"/>
-            <a:ext cx="894797" cy="215444"/>
+            <a:ext cx="947695" cy="215444"/>
           </a:xfrm>
           <a:prstGeom prst="rect">
             <a:avLst/>
@@ -13898,7 +11413,7 @@
           <a:lstStyle/>
           <a:p>
             <a:r>
-              <a:rPr lang="en-DE" sz="800" b="1" dirty="0">
+              <a:rPr lang="en-US" sz="800" b="1" dirty="0">
                 <a:solidFill>
                   <a:schemeClr val="tx1">
                     <a:lumMod val="50000"/>
@@ -13906,8 +11421,16 @@
                   </a:schemeClr>
                 </a:solidFill>
               </a:rPr>
-              <a:t>SAP HANA Cloud</a:t>
-            </a:r>
+              <a:t>Easy Franchise DB</a:t>
+            </a:r>
+            <a:endParaRPr lang="en-DE" sz="800" b="1" dirty="0">
+              <a:solidFill>
+                <a:schemeClr val="tx1">
+                  <a:lumMod val="50000"/>
+                  <a:lumOff val="50000"/>
+                </a:schemeClr>
+              </a:solidFill>
+            </a:endParaRPr>
           </a:p>
         </p:txBody>
       </p:sp>
@@ -13926,7 +11449,7 @@
           <p:nvPr/>
         </p:nvPicPr>
         <p:blipFill>
-          <a:blip r:embed="rId7">
+          <a:blip r:embed="rId6">
             <a:duotone>
               <a:prstClr val="black"/>
               <a:schemeClr val="accent3">
@@ -13980,7 +11503,7 @@
           <p:nvPr/>
         </p:nvPicPr>
         <p:blipFill>
-          <a:blip r:embed="rId7">
+          <a:blip r:embed="rId6">
             <a:duotone>
               <a:prstClr val="black"/>
               <a:schemeClr val="accent3">
@@ -14034,7 +11557,7 @@
           <p:nvPr/>
         </p:nvPicPr>
         <p:blipFill>
-          <a:blip r:embed="rId7">
+          <a:blip r:embed="rId6">
             <a:duotone>
               <a:prstClr val="black"/>
               <a:schemeClr val="accent3">
@@ -14088,7 +11611,7 @@
           <p:nvPr/>
         </p:nvPicPr>
         <p:blipFill>
-          <a:blip r:embed="rId7">
+          <a:blip r:embed="rId6">
             <a:duotone>
               <a:prstClr val="black"/>
               <a:schemeClr val="accent3">
@@ -15499,7 +13022,7 @@
           <p:nvPr/>
         </p:nvPicPr>
         <p:blipFill>
-          <a:blip r:embed="rId8">
+          <a:blip r:embed="rId7">
             <a:extLst>
               <a:ext uri="{28A0092B-C50C-407E-A947-70E740481C1C}">
                 <a14:useLocalDpi xmlns:a14="http://schemas.microsoft.com/office/drawing/2010/main" val="0"/>
@@ -15735,7 +13258,7 @@
           <p:nvPr/>
         </p:nvPicPr>
         <p:blipFill>
-          <a:blip r:embed="rId9">
+          <a:blip r:embed="rId8">
             <a:extLst>
               <a:ext uri="{28A0092B-C50C-407E-A947-70E740481C1C}">
                 <a14:useLocalDpi xmlns:a14="http://schemas.microsoft.com/office/drawing/2010/main" val="0"/>
@@ -15782,7 +13305,7 @@
           <p:nvPr/>
         </p:nvPicPr>
         <p:blipFill>
-          <a:blip r:embed="rId5">
+          <a:blip r:embed="rId4">
             <a:extLst>
               <a:ext uri="{28A0092B-C50C-407E-A947-70E740481C1C}">
                 <a14:useLocalDpi xmlns:a14="http://schemas.microsoft.com/office/drawing/2010/main" val="0"/>
@@ -15860,6 +13383,50 @@
               </a:rPr>
               <a:t>Service</a:t>
             </a:r>
+          </a:p>
+        </p:txBody>
+      </p:sp>
+      <p:sp>
+        <p:nvSpPr>
+          <p:cNvPr id="81" name="TextBox 80">
+            <a:extLst>
+              <a:ext uri="{FF2B5EF4-FFF2-40B4-BE49-F238E27FC236}">
+                <a16:creationId xmlns:a16="http://schemas.microsoft.com/office/drawing/2014/main" id="{E1940BF4-B6B9-497D-BD7F-4F6863DDD31F}"/>
+              </a:ext>
+            </a:extLst>
+          </p:cNvPr>
+          <p:cNvSpPr txBox="1"/>
+          <p:nvPr/>
+        </p:nvSpPr>
+        <p:spPr>
+          <a:xfrm>
+            <a:off x="6443895" y="1572048"/>
+            <a:ext cx="2647483" cy="246221"/>
+          </a:xfrm>
+          <a:prstGeom prst="rect">
+            <a:avLst/>
+          </a:prstGeom>
+          <a:noFill/>
+        </p:spPr>
+        <p:txBody>
+          <a:bodyPr wrap="square" rtlCol="0">
+            <a:spAutoFit/>
+          </a:bodyPr>
+          <a:lstStyle/>
+          <a:p>
+            <a:r>
+              <a:rPr lang="en-US" sz="1000" b="1" dirty="0">
+                <a:solidFill>
+                  <a:srgbClr val="5B9BD5"/>
+                </a:solidFill>
+              </a:rPr>
+              <a:t>SAP HANA Cloud</a:t>
+            </a:r>
+            <a:endParaRPr lang="de-DE" sz="1000" b="1" dirty="0">
+              <a:solidFill>
+                <a:srgbClr val="5B9BD5"/>
+              </a:solidFill>
+            </a:endParaRPr>
           </a:p>
         </p:txBody>
       </p:sp>
@@ -16859,53 +14426,6 @@
           </a:p>
         </p:txBody>
       </p:sp>
-      <p:pic>
-        <p:nvPicPr>
-          <p:cNvPr id="1028" name="Picture 4" descr="Cloud Foundry – Open Source Cloud Native Application Delivery">
-            <a:extLst>
-              <a:ext uri="{FF2B5EF4-FFF2-40B4-BE49-F238E27FC236}">
-                <a16:creationId xmlns:a16="http://schemas.microsoft.com/office/drawing/2014/main" id="{CBEBA09B-CC6D-5448-9FCE-CEB7170E6C16}"/>
-              </a:ext>
-            </a:extLst>
-          </p:cNvPr>
-          <p:cNvPicPr>
-            <a:picLocks noChangeAspect="1" noChangeArrowheads="1"/>
-          </p:cNvPicPr>
-          <p:nvPr/>
-        </p:nvPicPr>
-        <p:blipFill>
-          <a:blip r:embed="rId3">
-            <a:extLst>
-              <a:ext uri="{28A0092B-C50C-407E-A947-70E740481C1C}">
-                <a14:useLocalDpi xmlns:a14="http://schemas.microsoft.com/office/drawing/2010/main" val="0"/>
-              </a:ext>
-            </a:extLst>
-          </a:blip>
-          <a:srcRect/>
-          <a:stretch>
-            <a:fillRect/>
-          </a:stretch>
-        </p:blipFill>
-        <p:spPr bwMode="auto">
-          <a:xfrm>
-            <a:off x="6482349" y="1602012"/>
-            <a:ext cx="1063096" cy="145345"/>
-          </a:xfrm>
-          <a:prstGeom prst="rect">
-            <a:avLst/>
-          </a:prstGeom>
-          <a:noFill/>
-          <a:extLst>
-            <a:ext uri="{909E8E84-426E-40DD-AFC4-6F175D3DCCD1}">
-              <a14:hiddenFill xmlns:a14="http://schemas.microsoft.com/office/drawing/2010/main">
-                <a:solidFill>
-                  <a:srgbClr val="FFFFFF"/>
-                </a:solidFill>
-              </a14:hiddenFill>
-            </a:ext>
-          </a:extLst>
-        </p:spPr>
-      </p:pic>
       <p:sp>
         <p:nvSpPr>
           <p:cNvPr id="25" name="Rectangle 24">
@@ -17735,7 +15255,7 @@
           <p:nvPr/>
         </p:nvPicPr>
         <p:blipFill>
-          <a:blip r:embed="rId4">
+          <a:blip r:embed="rId3">
             <a:extLst>
               <a:ext uri="{28A0092B-C50C-407E-A947-70E740481C1C}">
                 <a14:useLocalDpi xmlns:a14="http://schemas.microsoft.com/office/drawing/2010/main" val="0"/>
@@ -17782,7 +15302,7 @@
           <p:nvPr/>
         </p:nvPicPr>
         <p:blipFill>
-          <a:blip r:embed="rId5">
+          <a:blip r:embed="rId4">
             <a:extLst>
               <a:ext uri="{28A0092B-C50C-407E-A947-70E740481C1C}">
                 <a14:useLocalDpi xmlns:a14="http://schemas.microsoft.com/office/drawing/2010/main" val="0"/>
@@ -17891,7 +15411,7 @@
         <p:spPr>
           <a:xfrm>
             <a:off x="6557325" y="1943462"/>
-            <a:ext cx="894797" cy="215444"/>
+            <a:ext cx="947695" cy="215444"/>
           </a:xfrm>
           <a:prstGeom prst="rect">
             <a:avLst/>
@@ -17905,7 +15425,7 @@
           <a:lstStyle/>
           <a:p>
             <a:r>
-              <a:rPr lang="en-DE" sz="800" b="1" dirty="0">
+              <a:rPr lang="en-US" sz="800" b="1" dirty="0">
                 <a:solidFill>
                   <a:schemeClr val="tx1">
                     <a:lumMod val="50000"/>
@@ -17913,8 +15433,16 @@
                   </a:schemeClr>
                 </a:solidFill>
               </a:rPr>
-              <a:t>SAP HANA Cloud</a:t>
-            </a:r>
+              <a:t>Easy Franchise DB</a:t>
+            </a:r>
+            <a:endParaRPr lang="en-DE" sz="800" b="1" dirty="0">
+              <a:solidFill>
+                <a:schemeClr val="tx1">
+                  <a:lumMod val="50000"/>
+                  <a:lumOff val="50000"/>
+                </a:schemeClr>
+              </a:solidFill>
+            </a:endParaRPr>
           </a:p>
         </p:txBody>
       </p:sp>
@@ -17933,7 +15461,7 @@
           <p:nvPr/>
         </p:nvPicPr>
         <p:blipFill>
-          <a:blip r:embed="rId6">
+          <a:blip r:embed="rId5">
             <a:duotone>
               <a:prstClr val="black"/>
               <a:schemeClr val="accent3">
@@ -17987,7 +15515,7 @@
           <p:nvPr/>
         </p:nvPicPr>
         <p:blipFill>
-          <a:blip r:embed="rId6">
+          <a:blip r:embed="rId5">
             <a:duotone>
               <a:prstClr val="black"/>
               <a:schemeClr val="accent3">
@@ -18041,7 +15569,7 @@
           <p:nvPr/>
         </p:nvPicPr>
         <p:blipFill>
-          <a:blip r:embed="rId6">
+          <a:blip r:embed="rId5">
             <a:duotone>
               <a:prstClr val="black"/>
               <a:schemeClr val="accent3">
@@ -18095,7 +15623,7 @@
           <p:nvPr/>
         </p:nvPicPr>
         <p:blipFill>
-          <a:blip r:embed="rId6">
+          <a:blip r:embed="rId5">
             <a:duotone>
               <a:prstClr val="black"/>
               <a:schemeClr val="accent3">
@@ -18520,7 +16048,7 @@
           <p:nvPr/>
         </p:nvPicPr>
         <p:blipFill>
-          <a:blip r:embed="rId7"/>
+          <a:blip r:embed="rId6"/>
           <a:stretch>
             <a:fillRect/>
           </a:stretch>
@@ -19192,7 +16720,7 @@
           <p:nvPr/>
         </p:nvPicPr>
         <p:blipFill>
-          <a:blip r:embed="rId5">
+          <a:blip r:embed="rId4">
             <a:extLst>
               <a:ext uri="{28A0092B-C50C-407E-A947-70E740481C1C}">
                 <a14:useLocalDpi xmlns:a14="http://schemas.microsoft.com/office/drawing/2010/main" val="0"/>
@@ -19239,7 +16767,7 @@
           <p:nvPr/>
         </p:nvPicPr>
         <p:blipFill>
-          <a:blip r:embed="rId5">
+          <a:blip r:embed="rId4">
             <a:extLst>
               <a:ext uri="{28A0092B-C50C-407E-A947-70E740481C1C}">
                 <a14:useLocalDpi xmlns:a14="http://schemas.microsoft.com/office/drawing/2010/main" val="0"/>
@@ -19286,7 +16814,7 @@
           <p:nvPr/>
         </p:nvPicPr>
         <p:blipFill>
-          <a:blip r:embed="rId8">
+          <a:blip r:embed="rId7">
             <a:extLst>
               <a:ext uri="{28A0092B-C50C-407E-A947-70E740481C1C}">
                 <a14:useLocalDpi xmlns:a14="http://schemas.microsoft.com/office/drawing/2010/main" val="0"/>
@@ -19318,6 +16846,50 @@
           </a:extLst>
         </p:spPr>
       </p:pic>
+      <p:sp>
+        <p:nvSpPr>
+          <p:cNvPr id="69" name="TextBox 68">
+            <a:extLst>
+              <a:ext uri="{FF2B5EF4-FFF2-40B4-BE49-F238E27FC236}">
+                <a16:creationId xmlns:a16="http://schemas.microsoft.com/office/drawing/2014/main" id="{3DF2F7F6-EB9E-45F2-B96C-0B0D61A67384}"/>
+              </a:ext>
+            </a:extLst>
+          </p:cNvPr>
+          <p:cNvSpPr txBox="1"/>
+          <p:nvPr/>
+        </p:nvSpPr>
+        <p:spPr>
+          <a:xfrm>
+            <a:off x="6443895" y="1572048"/>
+            <a:ext cx="2647483" cy="246221"/>
+          </a:xfrm>
+          <a:prstGeom prst="rect">
+            <a:avLst/>
+          </a:prstGeom>
+          <a:noFill/>
+        </p:spPr>
+        <p:txBody>
+          <a:bodyPr wrap="square" rtlCol="0">
+            <a:spAutoFit/>
+          </a:bodyPr>
+          <a:lstStyle/>
+          <a:p>
+            <a:r>
+              <a:rPr lang="en-US" sz="1000" b="1" dirty="0">
+                <a:solidFill>
+                  <a:srgbClr val="5B9BD5"/>
+                </a:solidFill>
+              </a:rPr>
+              <a:t>SAP HANA Cloud</a:t>
+            </a:r>
+            <a:endParaRPr lang="de-DE" sz="1000" b="1" dirty="0">
+              <a:solidFill>
+                <a:srgbClr val="5B9BD5"/>
+              </a:solidFill>
+            </a:endParaRPr>
+          </a:p>
+        </p:txBody>
+      </p:sp>
     </p:spTree>
     <p:extLst>
       <p:ext uri="{BB962C8B-B14F-4D97-AF65-F5344CB8AC3E}">
@@ -28088,4 +25660,299 @@
     </a:ext>
   </a:extLst>
 </a:theme>
+</file>
+
+<file path=ppt/theme/theme2.xml><?xml version="1.0" encoding="utf-8"?>
+<a:theme xmlns:a="http://schemas.openxmlformats.org/drawingml/2006/main" name="Office Theme">
+  <a:themeElements>
+    <a:clrScheme name="Office">
+      <a:dk1>
+        <a:sysClr val="windowText" lastClr="000000"/>
+      </a:dk1>
+      <a:lt1>
+        <a:sysClr val="window" lastClr="FFFFFF"/>
+      </a:lt1>
+      <a:dk2>
+        <a:srgbClr val="44546A"/>
+      </a:dk2>
+      <a:lt2>
+        <a:srgbClr val="E7E6E6"/>
+      </a:lt2>
+      <a:accent1>
+        <a:srgbClr val="4472C4"/>
+      </a:accent1>
+      <a:accent2>
+        <a:srgbClr val="ED7D31"/>
+      </a:accent2>
+      <a:accent3>
+        <a:srgbClr val="A5A5A5"/>
+      </a:accent3>
+      <a:accent4>
+        <a:srgbClr val="FFC000"/>
+      </a:accent4>
+      <a:accent5>
+        <a:srgbClr val="5B9BD5"/>
+      </a:accent5>
+      <a:accent6>
+        <a:srgbClr val="70AD47"/>
+      </a:accent6>
+      <a:hlink>
+        <a:srgbClr val="0563C1"/>
+      </a:hlink>
+      <a:folHlink>
+        <a:srgbClr val="954F72"/>
+      </a:folHlink>
+    </a:clrScheme>
+    <a:fontScheme name="Office">
+      <a:majorFont>
+        <a:latin typeface="Calibri Light" panose="020F0302020204030204"/>
+        <a:ea typeface=""/>
+        <a:cs typeface=""/>
+        <a:font script="Jpan" typeface="游ゴシック Light"/>
+        <a:font script="Hang" typeface="맑은 고딕"/>
+        <a:font script="Hans" typeface="等线 Light"/>
+        <a:font script="Hant" typeface="新細明體"/>
+        <a:font script="Arab" typeface="Times New Roman"/>
+        <a:font script="Hebr" typeface="Times New Roman"/>
+        <a:font script="Thai" typeface="Angsana New"/>
+        <a:font script="Ethi" typeface="Nyala"/>
+        <a:font script="Beng" typeface="Vrinda"/>
+        <a:font script="Gujr" typeface="Shruti"/>
+        <a:font script="Khmr" typeface="MoolBoran"/>
+        <a:font script="Knda" typeface="Tunga"/>
+        <a:font script="Guru" typeface="Raavi"/>
+        <a:font script="Cans" typeface="Euphemia"/>
+        <a:font script="Cher" typeface="Plantagenet Cherokee"/>
+        <a:font script="Yiii" typeface="Microsoft Yi Baiti"/>
+        <a:font script="Tibt" typeface="Microsoft Himalaya"/>
+        <a:font script="Thaa" typeface="MV Boli"/>
+        <a:font script="Deva" typeface="Mangal"/>
+        <a:font script="Telu" typeface="Gautami"/>
+        <a:font script="Taml" typeface="Latha"/>
+        <a:font script="Syrc" typeface="Estrangelo Edessa"/>
+        <a:font script="Orya" typeface="Kalinga"/>
+        <a:font script="Mlym" typeface="Kartika"/>
+        <a:font script="Laoo" typeface="DokChampa"/>
+        <a:font script="Sinh" typeface="Iskoola Pota"/>
+        <a:font script="Mong" typeface="Mongolian Baiti"/>
+        <a:font script="Viet" typeface="Times New Roman"/>
+        <a:font script="Uigh" typeface="Microsoft Uighur"/>
+        <a:font script="Geor" typeface="Sylfaen"/>
+        <a:font script="Armn" typeface="Arial"/>
+        <a:font script="Bugi" typeface="Leelawadee UI"/>
+        <a:font script="Bopo" typeface="Microsoft JhengHei"/>
+        <a:font script="Java" typeface="Javanese Text"/>
+        <a:font script="Lisu" typeface="Segoe UI"/>
+        <a:font script="Mymr" typeface="Myanmar Text"/>
+        <a:font script="Nkoo" typeface="Ebrima"/>
+        <a:font script="Olck" typeface="Nirmala UI"/>
+        <a:font script="Osma" typeface="Ebrima"/>
+        <a:font script="Phag" typeface="Phagspa"/>
+        <a:font script="Syrn" typeface="Estrangelo Edessa"/>
+        <a:font script="Syrj" typeface="Estrangelo Edessa"/>
+        <a:font script="Syre" typeface="Estrangelo Edessa"/>
+        <a:font script="Sora" typeface="Nirmala UI"/>
+        <a:font script="Tale" typeface="Microsoft Tai Le"/>
+        <a:font script="Talu" typeface="Microsoft New Tai Lue"/>
+        <a:font script="Tfng" typeface="Ebrima"/>
+      </a:majorFont>
+      <a:minorFont>
+        <a:latin typeface="Calibri" panose="020F0502020204030204"/>
+        <a:ea typeface=""/>
+        <a:cs typeface=""/>
+        <a:font script="Jpan" typeface="游ゴシック"/>
+        <a:font script="Hang" typeface="맑은 고딕"/>
+        <a:font script="Hans" typeface="等线"/>
+        <a:font script="Hant" typeface="新細明體"/>
+        <a:font script="Arab" typeface="Arial"/>
+        <a:font script="Hebr" typeface="Arial"/>
+        <a:font script="Thai" typeface="Cordia New"/>
+        <a:font script="Ethi" typeface="Nyala"/>
+        <a:font script="Beng" typeface="Vrinda"/>
+        <a:font script="Gujr" typeface="Shruti"/>
+        <a:font script="Khmr" typeface="DaunPenh"/>
+        <a:font script="Knda" typeface="Tunga"/>
+        <a:font script="Guru" typeface="Raavi"/>
+        <a:font script="Cans" typeface="Euphemia"/>
+        <a:font script="Cher" typeface="Plantagenet Cherokee"/>
+        <a:font script="Yiii" typeface="Microsoft Yi Baiti"/>
+        <a:font script="Tibt" typeface="Microsoft Himalaya"/>
+        <a:font script="Thaa" typeface="MV Boli"/>
+        <a:font script="Deva" typeface="Mangal"/>
+        <a:font script="Telu" typeface="Gautami"/>
+        <a:font script="Taml" typeface="Latha"/>
+        <a:font script="Syrc" typeface="Estrangelo Edessa"/>
+        <a:font script="Orya" typeface="Kalinga"/>
+        <a:font script="Mlym" typeface="Kartika"/>
+        <a:font script="Laoo" typeface="DokChampa"/>
+        <a:font script="Sinh" typeface="Iskoola Pota"/>
+        <a:font script="Mong" typeface="Mongolian Baiti"/>
+        <a:font script="Viet" typeface="Arial"/>
+        <a:font script="Uigh" typeface="Microsoft Uighur"/>
+        <a:font script="Geor" typeface="Sylfaen"/>
+        <a:font script="Armn" typeface="Arial"/>
+        <a:font script="Bugi" typeface="Leelawadee UI"/>
+        <a:font script="Bopo" typeface="Microsoft JhengHei"/>
+        <a:font script="Java" typeface="Javanese Text"/>
+        <a:font script="Lisu" typeface="Segoe UI"/>
+        <a:font script="Mymr" typeface="Myanmar Text"/>
+        <a:font script="Nkoo" typeface="Ebrima"/>
+        <a:font script="Olck" typeface="Nirmala UI"/>
+        <a:font script="Osma" typeface="Ebrima"/>
+        <a:font script="Phag" typeface="Phagspa"/>
+        <a:font script="Syrn" typeface="Estrangelo Edessa"/>
+        <a:font script="Syrj" typeface="Estrangelo Edessa"/>
+        <a:font script="Syre" typeface="Estrangelo Edessa"/>
+        <a:font script="Sora" typeface="Nirmala UI"/>
+        <a:font script="Tale" typeface="Microsoft Tai Le"/>
+        <a:font script="Talu" typeface="Microsoft New Tai Lue"/>
+        <a:font script="Tfng" typeface="Ebrima"/>
+      </a:minorFont>
+    </a:fontScheme>
+    <a:fmtScheme name="Office">
+      <a:fillStyleLst>
+        <a:solidFill>
+          <a:schemeClr val="phClr"/>
+        </a:solidFill>
+        <a:gradFill rotWithShape="1">
+          <a:gsLst>
+            <a:gs pos="0">
+              <a:schemeClr val="phClr">
+                <a:lumMod val="110000"/>
+                <a:satMod val="105000"/>
+                <a:tint val="67000"/>
+              </a:schemeClr>
+            </a:gs>
+            <a:gs pos="50000">
+              <a:schemeClr val="phClr">
+                <a:lumMod val="105000"/>
+                <a:satMod val="103000"/>
+                <a:tint val="73000"/>
+              </a:schemeClr>
+            </a:gs>
+            <a:gs pos="100000">
+              <a:schemeClr val="phClr">
+                <a:lumMod val="105000"/>
+                <a:satMod val="109000"/>
+                <a:tint val="81000"/>
+              </a:schemeClr>
+            </a:gs>
+          </a:gsLst>
+          <a:lin ang="5400000" scaled="0"/>
+        </a:gradFill>
+        <a:gradFill rotWithShape="1">
+          <a:gsLst>
+            <a:gs pos="0">
+              <a:schemeClr val="phClr">
+                <a:satMod val="103000"/>
+                <a:lumMod val="102000"/>
+                <a:tint val="94000"/>
+              </a:schemeClr>
+            </a:gs>
+            <a:gs pos="50000">
+              <a:schemeClr val="phClr">
+                <a:satMod val="110000"/>
+                <a:lumMod val="100000"/>
+                <a:shade val="100000"/>
+              </a:schemeClr>
+            </a:gs>
+            <a:gs pos="100000">
+              <a:schemeClr val="phClr">
+                <a:lumMod val="99000"/>
+                <a:satMod val="120000"/>
+                <a:shade val="78000"/>
+              </a:schemeClr>
+            </a:gs>
+          </a:gsLst>
+          <a:lin ang="5400000" scaled="0"/>
+        </a:gradFill>
+      </a:fillStyleLst>
+      <a:lnStyleLst>
+        <a:ln w="6350" cap="flat" cmpd="sng" algn="ctr">
+          <a:solidFill>
+            <a:schemeClr val="phClr"/>
+          </a:solidFill>
+          <a:prstDash val="solid"/>
+          <a:miter lim="800000"/>
+        </a:ln>
+        <a:ln w="12700" cap="flat" cmpd="sng" algn="ctr">
+          <a:solidFill>
+            <a:schemeClr val="phClr"/>
+          </a:solidFill>
+          <a:prstDash val="solid"/>
+          <a:miter lim="800000"/>
+        </a:ln>
+        <a:ln w="19050" cap="flat" cmpd="sng" algn="ctr">
+          <a:solidFill>
+            <a:schemeClr val="phClr"/>
+          </a:solidFill>
+          <a:prstDash val="solid"/>
+          <a:miter lim="800000"/>
+        </a:ln>
+      </a:lnStyleLst>
+      <a:effectStyleLst>
+        <a:effectStyle>
+          <a:effectLst/>
+        </a:effectStyle>
+        <a:effectStyle>
+          <a:effectLst/>
+        </a:effectStyle>
+        <a:effectStyle>
+          <a:effectLst>
+            <a:outerShdw blurRad="57150" dist="19050" dir="5400000" algn="ctr" rotWithShape="0">
+              <a:srgbClr val="000000">
+                <a:alpha val="63000"/>
+              </a:srgbClr>
+            </a:outerShdw>
+          </a:effectLst>
+        </a:effectStyle>
+      </a:effectStyleLst>
+      <a:bgFillStyleLst>
+        <a:solidFill>
+          <a:schemeClr val="phClr"/>
+        </a:solidFill>
+        <a:solidFill>
+          <a:schemeClr val="phClr">
+            <a:tint val="95000"/>
+            <a:satMod val="170000"/>
+          </a:schemeClr>
+        </a:solidFill>
+        <a:gradFill rotWithShape="1">
+          <a:gsLst>
+            <a:gs pos="0">
+              <a:schemeClr val="phClr">
+                <a:tint val="93000"/>
+                <a:satMod val="150000"/>
+                <a:shade val="98000"/>
+                <a:lumMod val="102000"/>
+              </a:schemeClr>
+            </a:gs>
+            <a:gs pos="50000">
+              <a:schemeClr val="phClr">
+                <a:tint val="98000"/>
+                <a:satMod val="130000"/>
+                <a:shade val="90000"/>
+                <a:lumMod val="103000"/>
+              </a:schemeClr>
+            </a:gs>
+            <a:gs pos="100000">
+              <a:schemeClr val="phClr">
+                <a:shade val="63000"/>
+                <a:satMod val="120000"/>
+              </a:schemeClr>
+            </a:gs>
+          </a:gsLst>
+          <a:lin ang="5400000" scaled="0"/>
+        </a:gradFill>
+      </a:bgFillStyleLst>
+    </a:fmtScheme>
+  </a:themeElements>
+  <a:objectDefaults/>
+  <a:extraClrSchemeLst/>
+  <a:extLst>
+    <a:ext uri="{05A4C25C-085E-4340-85A3-A5531E510DB2}">
+      <thm15:themeFamily xmlns:thm15="http://schemas.microsoft.com/office/thememl/2012/main" name="Office Theme" id="{62F939B6-93AF-4DB8-9C6B-D6C7DFDC589F}" vid="{4A3C46E8-61CC-4603-A589-7422A47A8E4A}"/>
+    </a:ext>
+  </a:extLst>
+</a:theme>
 </file>
</xml_diff>